<commit_message>
updating legend for orders
</commit_message>
<xml_diff>
--- a/pptx/covid_us_dashboard.pptx
+++ b/pptx/covid_us_dashboard.pptx
@@ -5,19 +5,24 @@
     <p:sldMasterId id="2147483668" r:id="rId1"/>
   </p:sldMasterIdLst>
   <p:notesMasterIdLst>
-    <p:notesMasterId r:id="rId12"/>
+    <p:notesMasterId r:id="rId17"/>
   </p:notesMasterIdLst>
   <p:sldIdLst>
     <p:sldId id="256" r:id="rId2"/>
     <p:sldId id="258" r:id="rId3"/>
     <p:sldId id="259" r:id="rId4"/>
-    <p:sldId id="261" r:id="rId5"/>
-    <p:sldId id="263" r:id="rId6"/>
-    <p:sldId id="265" r:id="rId7"/>
-    <p:sldId id="266" r:id="rId8"/>
-    <p:sldId id="264" r:id="rId9"/>
-    <p:sldId id="262" r:id="rId10"/>
-    <p:sldId id="260" r:id="rId11"/>
+    <p:sldId id="272" r:id="rId5"/>
+    <p:sldId id="268" r:id="rId6"/>
+    <p:sldId id="275" r:id="rId7"/>
+    <p:sldId id="273" r:id="rId8"/>
+    <p:sldId id="274" r:id="rId9"/>
+    <p:sldId id="261" r:id="rId10"/>
+    <p:sldId id="263" r:id="rId11"/>
+    <p:sldId id="265" r:id="rId12"/>
+    <p:sldId id="266" r:id="rId13"/>
+    <p:sldId id="264" r:id="rId14"/>
+    <p:sldId id="262" r:id="rId15"/>
+    <p:sldId id="260" r:id="rId16"/>
   </p:sldIdLst>
   <p:sldSz cx="9144000" cy="5143500" type="screen16x9"/>
   <p:notesSz cx="6858000" cy="9144000"/>
@@ -18490,687 +18495,6 @@
   <p:cSld>
     <p:spTree>
       <p:nvGrpSpPr>
-        <p:cNvPr id="1" name="Shape 207"/>
-        <p:cNvGrpSpPr/>
-        <p:nvPr/>
-      </p:nvGrpSpPr>
-      <p:grpSpPr>
-        <a:xfrm>
-          <a:off x="0" y="0"/>
-          <a:ext cx="0" cy="0"/>
-          <a:chOff x="0" y="0"/>
-          <a:chExt cx="0" cy="0"/>
-        </a:xfrm>
-      </p:grpSpPr>
-    </p:spTree>
-  </p:cSld>
-  <p:clrMapOvr>
-    <a:masterClrMapping/>
-  </p:clrMapOvr>
-  <p:timing>
-    <p:tnLst>
-      <p:par>
-        <p:cTn id="1" dur="indefinite" restart="never" nodeType="tmRoot"/>
-      </p:par>
-    </p:tnLst>
-  </p:timing>
-</p:sld>
-</file>
-
-<file path=ppt/slides/slide2.xml><?xml version="1.0" encoding="utf-8"?>
-<p:sld xmlns:a="http://schemas.openxmlformats.org/drawingml/2006/main" xmlns:r="http://schemas.openxmlformats.org/officeDocument/2006/relationships" xmlns:p="http://schemas.openxmlformats.org/presentationml/2006/main">
-  <p:cSld>
-    <p:spTree>
-      <p:nvGrpSpPr>
-        <p:cNvPr id="1" name="Shape 186"/>
-        <p:cNvGrpSpPr/>
-        <p:nvPr/>
-      </p:nvGrpSpPr>
-      <p:grpSpPr>
-        <a:xfrm>
-          <a:off x="0" y="0"/>
-          <a:ext cx="0" cy="0"/>
-          <a:chOff x="0" y="0"/>
-          <a:chExt cx="0" cy="0"/>
-        </a:xfrm>
-      </p:grpSpPr>
-      <p:sp>
-        <p:nvSpPr>
-          <p:cNvPr id="188" name="Google Shape;188;p24"/>
-          <p:cNvSpPr txBox="1">
-            <a:spLocks noGrp="1"/>
-          </p:cNvSpPr>
-          <p:nvPr>
-            <p:ph type="title"/>
-          </p:nvPr>
-        </p:nvSpPr>
-        <p:spPr>
-          <a:xfrm>
-            <a:off x="254000" y="327899"/>
-            <a:ext cx="8514080" cy="434101"/>
-          </a:xfrm>
-          <a:prstGeom prst="rect">
-            <a:avLst/>
-          </a:prstGeom>
-          <a:noFill/>
-          <a:ln>
-            <a:noFill/>
-          </a:ln>
-        </p:spPr>
-        <p:txBody>
-          <a:bodyPr spcFirstLastPara="1" wrap="square" lIns="91425" tIns="45700" rIns="91425" bIns="45700" anchor="t" anchorCtr="0">
-            <a:noAutofit/>
-          </a:bodyPr>
-          <a:lstStyle/>
-          <a:p>
-            <a:pPr lvl="0">
-              <a:buSzPts val="2400"/>
-            </a:pPr>
-            <a:r>
-              <a:rPr lang="en-US" dirty="0"/>
-              <a:t>Motivation</a:t>
-            </a:r>
-            <a:endParaRPr dirty="0"/>
-          </a:p>
-        </p:txBody>
-      </p:sp>
-      <p:sp>
-        <p:nvSpPr>
-          <p:cNvPr id="190" name="Google Shape;190;p24"/>
-          <p:cNvSpPr txBox="1">
-            <a:spLocks noGrp="1"/>
-          </p:cNvSpPr>
-          <p:nvPr>
-            <p:ph type="body" idx="3"/>
-          </p:nvPr>
-        </p:nvSpPr>
-        <p:spPr>
-          <a:xfrm>
-            <a:off x="1088361" y="988855"/>
-            <a:ext cx="7066784" cy="3469913"/>
-          </a:xfrm>
-          <a:prstGeom prst="rect">
-            <a:avLst/>
-          </a:prstGeom>
-          <a:noFill/>
-          <a:ln>
-            <a:noFill/>
-          </a:ln>
-        </p:spPr>
-        <p:txBody>
-          <a:bodyPr spcFirstLastPara="1" wrap="square" lIns="91425" tIns="45700" rIns="91425" bIns="45700" anchor="t" anchorCtr="0">
-            <a:noAutofit/>
-          </a:bodyPr>
-          <a:lstStyle/>
-          <a:p>
-            <a:pPr marL="114300" indent="0">
-              <a:buNone/>
-            </a:pPr>
-            <a:r>
-              <a:rPr lang="en-US" dirty="0" smtClean="0"/>
-              <a:t>Goal: </a:t>
-            </a:r>
-          </a:p>
-          <a:p>
-            <a:pPr marL="114300" indent="0">
-              <a:buNone/>
-            </a:pPr>
-            <a:r>
-              <a:rPr lang="en-US" dirty="0" smtClean="0"/>
-              <a:t>Help answer the question “</a:t>
-            </a:r>
-            <a:r>
-              <a:rPr lang="en-US" i="1" dirty="0" smtClean="0"/>
-              <a:t>are states taking appropriate action in response to COVID-19</a:t>
-            </a:r>
-            <a:r>
-              <a:rPr lang="en-US" dirty="0" smtClean="0"/>
-              <a:t>?”</a:t>
-            </a:r>
-          </a:p>
-          <a:p>
-            <a:pPr marL="114300" indent="0">
-              <a:buNone/>
-            </a:pPr>
-            <a:endParaRPr lang="en-US" dirty="0" smtClean="0"/>
-          </a:p>
-          <a:p>
-            <a:pPr marL="114300" indent="0">
-              <a:buNone/>
-            </a:pPr>
-            <a:r>
-              <a:rPr lang="en-US" dirty="0" smtClean="0"/>
-              <a:t>Approach:</a:t>
-            </a:r>
-            <a:endParaRPr lang="en-US" dirty="0"/>
-          </a:p>
-          <a:p>
-            <a:r>
-              <a:rPr lang="en-US" dirty="0" smtClean="0"/>
-              <a:t>Design </a:t>
-            </a:r>
-            <a:r>
-              <a:rPr lang="en-US" dirty="0"/>
-              <a:t>an interactive tool to explore COVID-19 data from each state</a:t>
-            </a:r>
-          </a:p>
-          <a:p>
-            <a:pPr lvl="1"/>
-            <a:r>
-              <a:rPr lang="en-US" dirty="0"/>
-              <a:t>Both relative to all other states, and absolute scales</a:t>
-            </a:r>
-          </a:p>
-          <a:p>
-            <a:pPr lvl="1"/>
-            <a:r>
-              <a:rPr lang="en-US" dirty="0"/>
-              <a:t>Monitor individual states responses (</a:t>
-            </a:r>
-            <a:r>
-              <a:rPr lang="en-US" dirty="0" err="1"/>
-              <a:t>ie</a:t>
-            </a:r>
-            <a:r>
-              <a:rPr lang="en-US" dirty="0"/>
-              <a:t>. Lockdown orders)</a:t>
-            </a:r>
-          </a:p>
-          <a:p>
-            <a:pPr lvl="1"/>
-            <a:r>
-              <a:rPr lang="en-US" dirty="0"/>
-              <a:t>Allow sorting/filtering to view trends between states</a:t>
-            </a:r>
-          </a:p>
-          <a:p>
-            <a:pPr marL="457200" lvl="0" indent="-342900" algn="l" rtl="0">
-              <a:spcBef>
-                <a:spcPts val="0"/>
-              </a:spcBef>
-              <a:spcAft>
-                <a:spcPts val="0"/>
-              </a:spcAft>
-              <a:buSzPts val="1800"/>
-              <a:buAutoNum type="arabicPeriod"/>
-            </a:pPr>
-            <a:endParaRPr dirty="0"/>
-          </a:p>
-        </p:txBody>
-      </p:sp>
-      <p:sp>
-        <p:nvSpPr>
-          <p:cNvPr id="191" name="Google Shape;191;p24"/>
-          <p:cNvSpPr txBox="1">
-            <a:spLocks noGrp="1"/>
-          </p:cNvSpPr>
-          <p:nvPr>
-            <p:ph type="dt" idx="10"/>
-          </p:nvPr>
-        </p:nvSpPr>
-        <p:spPr>
-          <a:xfrm>
-            <a:off x="253999" y="4802823"/>
-            <a:ext cx="1422401" cy="274637"/>
-          </a:xfrm>
-          <a:prstGeom prst="rect">
-            <a:avLst/>
-          </a:prstGeom>
-          <a:noFill/>
-          <a:ln>
-            <a:noFill/>
-          </a:ln>
-        </p:spPr>
-        <p:txBody>
-          <a:bodyPr spcFirstLastPara="1" wrap="square" lIns="91425" tIns="45700" rIns="91425" bIns="45700" anchor="ctr" anchorCtr="0">
-            <a:noAutofit/>
-          </a:bodyPr>
-          <a:lstStyle/>
-          <a:p>
-            <a:pPr marL="0" lvl="0" indent="0" algn="l" rtl="0">
-              <a:spcBef>
-                <a:spcPts val="0"/>
-              </a:spcBef>
-              <a:spcAft>
-                <a:spcPts val="0"/>
-              </a:spcAft>
-              <a:buNone/>
-            </a:pPr>
-            <a:endParaRPr/>
-          </a:p>
-        </p:txBody>
-      </p:sp>
-      <p:sp>
-        <p:nvSpPr>
-          <p:cNvPr id="192" name="Google Shape;192;p24"/>
-          <p:cNvSpPr txBox="1">
-            <a:spLocks noGrp="1"/>
-          </p:cNvSpPr>
-          <p:nvPr>
-            <p:ph type="ftr" idx="11"/>
-          </p:nvPr>
-        </p:nvSpPr>
-        <p:spPr>
-          <a:xfrm>
-            <a:off x="1676401" y="4802823"/>
-            <a:ext cx="5791199" cy="274637"/>
-          </a:xfrm>
-          <a:prstGeom prst="rect">
-            <a:avLst/>
-          </a:prstGeom>
-          <a:noFill/>
-          <a:ln>
-            <a:noFill/>
-          </a:ln>
-        </p:spPr>
-        <p:txBody>
-          <a:bodyPr spcFirstLastPara="1" wrap="square" lIns="91425" tIns="45700" rIns="91425" bIns="45700" anchor="ctr" anchorCtr="0">
-            <a:noAutofit/>
-          </a:bodyPr>
-          <a:lstStyle/>
-          <a:p>
-            <a:pPr marL="0" lvl="0" indent="0" algn="ctr" rtl="0">
-              <a:spcBef>
-                <a:spcPts val="0"/>
-              </a:spcBef>
-              <a:spcAft>
-                <a:spcPts val="0"/>
-              </a:spcAft>
-              <a:buNone/>
-            </a:pPr>
-            <a:endParaRPr/>
-          </a:p>
-        </p:txBody>
-      </p:sp>
-      <p:sp>
-        <p:nvSpPr>
-          <p:cNvPr id="193" name="Google Shape;193;p24"/>
-          <p:cNvSpPr txBox="1">
-            <a:spLocks noGrp="1"/>
-          </p:cNvSpPr>
-          <p:nvPr>
-            <p:ph type="sldNum" idx="12"/>
-          </p:nvPr>
-        </p:nvSpPr>
-        <p:spPr>
-          <a:xfrm>
-            <a:off x="7467600" y="4802823"/>
-            <a:ext cx="586130" cy="272097"/>
-          </a:xfrm>
-          <a:prstGeom prst="rect">
-            <a:avLst/>
-          </a:prstGeom>
-          <a:noFill/>
-          <a:ln>
-            <a:noFill/>
-          </a:ln>
-        </p:spPr>
-        <p:txBody>
-          <a:bodyPr spcFirstLastPara="1" wrap="square" lIns="91425" tIns="45700" rIns="91425" bIns="45700" anchor="ctr" anchorCtr="0">
-            <a:noAutofit/>
-          </a:bodyPr>
-          <a:lstStyle/>
-          <a:p>
-            <a:pPr marL="0" lvl="0" indent="0" algn="r" rtl="0">
-              <a:spcBef>
-                <a:spcPts val="0"/>
-              </a:spcBef>
-              <a:spcAft>
-                <a:spcPts val="0"/>
-              </a:spcAft>
-              <a:buNone/>
-            </a:pPr>
-            <a:endParaRPr/>
-          </a:p>
-        </p:txBody>
-      </p:sp>
-    </p:spTree>
-  </p:cSld>
-  <p:clrMapOvr>
-    <a:masterClrMapping/>
-  </p:clrMapOvr>
-  <p:timing>
-    <p:tnLst>
-      <p:par>
-        <p:cTn id="1" dur="indefinite" restart="never" nodeType="tmRoot"/>
-      </p:par>
-    </p:tnLst>
-  </p:timing>
-</p:sld>
-</file>
-
-<file path=ppt/slides/slide3.xml><?xml version="1.0" encoding="utf-8"?>
-<p:sld xmlns:a="http://schemas.openxmlformats.org/drawingml/2006/main" xmlns:r="http://schemas.openxmlformats.org/officeDocument/2006/relationships" xmlns:p="http://schemas.openxmlformats.org/presentationml/2006/main">
-  <p:cSld>
-    <p:spTree>
-      <p:nvGrpSpPr>
-        <p:cNvPr id="1" name="Shape 198"/>
-        <p:cNvGrpSpPr/>
-        <p:nvPr/>
-      </p:nvGrpSpPr>
-      <p:grpSpPr>
-        <a:xfrm>
-          <a:off x="0" y="0"/>
-          <a:ext cx="0" cy="0"/>
-          <a:chOff x="0" y="0"/>
-          <a:chExt cx="0" cy="0"/>
-        </a:xfrm>
-      </p:grpSpPr>
-      <p:sp>
-        <p:nvSpPr>
-          <p:cNvPr id="200" name="Google Shape;200;p25"/>
-          <p:cNvSpPr txBox="1">
-            <a:spLocks noGrp="1"/>
-          </p:cNvSpPr>
-          <p:nvPr>
-            <p:ph type="title"/>
-          </p:nvPr>
-        </p:nvSpPr>
-        <p:spPr>
-          <a:xfrm>
-            <a:off x="254000" y="327899"/>
-            <a:ext cx="8514000" cy="434100"/>
-          </a:xfrm>
-          <a:prstGeom prst="rect">
-            <a:avLst/>
-          </a:prstGeom>
-        </p:spPr>
-        <p:txBody>
-          <a:bodyPr spcFirstLastPara="1" wrap="square" lIns="91425" tIns="45700" rIns="91425" bIns="45700" anchor="t" anchorCtr="0">
-            <a:noAutofit/>
-          </a:bodyPr>
-          <a:lstStyle/>
-          <a:p>
-            <a:pPr lvl="0"/>
-            <a:r>
-              <a:rPr lang="en-US" dirty="0"/>
-              <a:t>Technology Used</a:t>
-            </a:r>
-            <a:endParaRPr dirty="0"/>
-          </a:p>
-        </p:txBody>
-      </p:sp>
-      <p:sp>
-        <p:nvSpPr>
-          <p:cNvPr id="202" name="Google Shape;202;p25"/>
-          <p:cNvSpPr txBox="1">
-            <a:spLocks noGrp="1"/>
-          </p:cNvSpPr>
-          <p:nvPr>
-            <p:ph type="body" idx="3"/>
-          </p:nvPr>
-        </p:nvSpPr>
-        <p:spPr>
-          <a:xfrm>
-            <a:off x="949233" y="1343834"/>
-            <a:ext cx="6780300" cy="3409649"/>
-          </a:xfrm>
-          <a:prstGeom prst="rect">
-            <a:avLst/>
-          </a:prstGeom>
-        </p:spPr>
-        <p:txBody>
-          <a:bodyPr spcFirstLastPara="1" wrap="square" lIns="91425" tIns="45700" rIns="91425" bIns="45700" anchor="t" anchorCtr="0">
-            <a:noAutofit/>
-          </a:bodyPr>
-          <a:lstStyle/>
-          <a:p>
-            <a:r>
-              <a:rPr lang="en-US" dirty="0"/>
-              <a:t>Dashboard</a:t>
-            </a:r>
-          </a:p>
-          <a:p>
-            <a:pPr lvl="1"/>
-            <a:r>
-              <a:rPr lang="en-US" dirty="0"/>
-              <a:t>Built in </a:t>
-            </a:r>
-            <a:r>
-              <a:rPr lang="en-US" dirty="0" smtClean="0"/>
-              <a:t>D3</a:t>
-            </a:r>
-          </a:p>
-          <a:p>
-            <a:pPr lvl="1"/>
-            <a:endParaRPr lang="en-US" dirty="0" smtClean="0"/>
-          </a:p>
-          <a:p>
-            <a:r>
-              <a:rPr lang="en-US" dirty="0" smtClean="0"/>
-              <a:t>Datasets</a:t>
-            </a:r>
-            <a:endParaRPr lang="en-US" dirty="0"/>
-          </a:p>
-          <a:p>
-            <a:pPr lvl="1"/>
-            <a:r>
-              <a:rPr lang="en-US" dirty="0" err="1"/>
-              <a:t>CovidTrackingProject</a:t>
-            </a:r>
-            <a:r>
-              <a:rPr lang="en-US" dirty="0"/>
-              <a:t> - API</a:t>
-            </a:r>
-          </a:p>
-          <a:p>
-            <a:pPr lvl="1"/>
-            <a:r>
-              <a:rPr lang="en-US" dirty="0" err="1"/>
-              <a:t>Johnhopkins</a:t>
-            </a:r>
-            <a:r>
-              <a:rPr lang="en-US" dirty="0"/>
-              <a:t> University - API</a:t>
-            </a:r>
-          </a:p>
-          <a:p>
-            <a:pPr lvl="1"/>
-            <a:r>
-              <a:rPr lang="en-US" dirty="0"/>
-              <a:t>US States lockdown orders - Manually gathered</a:t>
-            </a:r>
-          </a:p>
-          <a:p>
-            <a:pPr lvl="1"/>
-            <a:r>
-              <a:rPr lang="en-US" dirty="0"/>
-              <a:t>Other relevant state datasets (population, political </a:t>
-            </a:r>
-            <a:r>
-              <a:rPr lang="en-US" dirty="0" err="1"/>
-              <a:t>affliciation</a:t>
-            </a:r>
-            <a:r>
-              <a:rPr lang="en-US" dirty="0"/>
-              <a:t> etc.)</a:t>
-            </a:r>
-          </a:p>
-          <a:p>
-            <a:pPr marL="914400" lvl="0" indent="0" algn="l" rtl="0">
-              <a:spcBef>
-                <a:spcPts val="360"/>
-              </a:spcBef>
-              <a:spcAft>
-                <a:spcPts val="0"/>
-              </a:spcAft>
-              <a:buNone/>
-            </a:pPr>
-            <a:endParaRPr dirty="0"/>
-          </a:p>
-        </p:txBody>
-      </p:sp>
-      <p:sp>
-        <p:nvSpPr>
-          <p:cNvPr id="203" name="Google Shape;203;p25"/>
-          <p:cNvSpPr txBox="1">
-            <a:spLocks noGrp="1"/>
-          </p:cNvSpPr>
-          <p:nvPr>
-            <p:ph type="sldNum" idx="12"/>
-          </p:nvPr>
-        </p:nvSpPr>
-        <p:spPr>
-          <a:xfrm>
-            <a:off x="7467600" y="4802823"/>
-            <a:ext cx="586200" cy="272100"/>
-          </a:xfrm>
-          <a:prstGeom prst="rect">
-            <a:avLst/>
-          </a:prstGeom>
-        </p:spPr>
-        <p:txBody>
-          <a:bodyPr spcFirstLastPara="1" wrap="square" lIns="91425" tIns="45700" rIns="91425" bIns="45700" anchor="ctr" anchorCtr="0">
-            <a:noAutofit/>
-          </a:bodyPr>
-          <a:lstStyle/>
-          <a:p>
-            <a:pPr marL="0" lvl="0" indent="0" algn="r" rtl="0">
-              <a:spcBef>
-                <a:spcPts val="0"/>
-              </a:spcBef>
-              <a:spcAft>
-                <a:spcPts val="0"/>
-              </a:spcAft>
-              <a:buNone/>
-            </a:pPr>
-            <a:endParaRPr/>
-          </a:p>
-        </p:txBody>
-      </p:sp>
-    </p:spTree>
-  </p:cSld>
-  <p:clrMapOvr>
-    <a:masterClrMapping/>
-  </p:clrMapOvr>
-  <p:timing>
-    <p:tnLst>
-      <p:par>
-        <p:cTn id="1" dur="indefinite" restart="never" nodeType="tmRoot"/>
-      </p:par>
-    </p:tnLst>
-  </p:timing>
-</p:sld>
-</file>
-
-<file path=ppt/slides/slide4.xml><?xml version="1.0" encoding="utf-8"?>
-<p:sld xmlns:a="http://schemas.openxmlformats.org/drawingml/2006/main" xmlns:r="http://schemas.openxmlformats.org/officeDocument/2006/relationships" xmlns:p="http://schemas.openxmlformats.org/presentationml/2006/main">
-  <p:cSld>
-    <p:spTree>
-      <p:nvGrpSpPr>
-        <p:cNvPr id="1" name=""/>
-        <p:cNvGrpSpPr/>
-        <p:nvPr/>
-      </p:nvGrpSpPr>
-      <p:grpSpPr>
-        <a:xfrm>
-          <a:off x="0" y="0"/>
-          <a:ext cx="0" cy="0"/>
-          <a:chOff x="0" y="0"/>
-          <a:chExt cx="0" cy="0"/>
-        </a:xfrm>
-      </p:grpSpPr>
-      <p:sp>
-        <p:nvSpPr>
-          <p:cNvPr id="3" name="Title 2"/>
-          <p:cNvSpPr>
-            <a:spLocks noGrp="1"/>
-          </p:cNvSpPr>
-          <p:nvPr>
-            <p:ph type="title"/>
-          </p:nvPr>
-        </p:nvSpPr>
-        <p:spPr/>
-        <p:txBody>
-          <a:bodyPr/>
-          <a:lstStyle/>
-          <a:p>
-            <a:r>
-              <a:rPr lang="en-US" dirty="0" smtClean="0"/>
-              <a:t>Demo</a:t>
-            </a:r>
-            <a:endParaRPr lang="en-US" dirty="0"/>
-          </a:p>
-        </p:txBody>
-      </p:sp>
-      <p:sp>
-        <p:nvSpPr>
-          <p:cNvPr id="5" name="Text Placeholder 4"/>
-          <p:cNvSpPr>
-            <a:spLocks noGrp="1"/>
-          </p:cNvSpPr>
-          <p:nvPr>
-            <p:ph type="body" idx="3"/>
-          </p:nvPr>
-        </p:nvSpPr>
-        <p:spPr/>
-        <p:txBody>
-          <a:bodyPr/>
-          <a:lstStyle/>
-          <a:p>
-            <a:r>
-              <a:rPr lang="en-US" dirty="0">
-                <a:hlinkClick r:id="rId2"/>
-              </a:rPr>
-              <a:t>https://ericjunkins.github.io/covid-19-us-states/dashboard.html</a:t>
-            </a:r>
-            <a:endParaRPr lang="en-US" dirty="0"/>
-          </a:p>
-        </p:txBody>
-      </p:sp>
-      <p:sp>
-        <p:nvSpPr>
-          <p:cNvPr id="6" name="Slide Number Placeholder 5"/>
-          <p:cNvSpPr>
-            <a:spLocks noGrp="1"/>
-          </p:cNvSpPr>
-          <p:nvPr>
-            <p:ph type="sldNum" idx="12"/>
-          </p:nvPr>
-        </p:nvSpPr>
-        <p:spPr/>
-        <p:txBody>
-          <a:bodyPr/>
-          <a:lstStyle/>
-          <a:p>
-            <a:pPr marL="0" lvl="0" indent="0" algn="r" rtl="0">
-              <a:spcBef>
-                <a:spcPts val="0"/>
-              </a:spcBef>
-              <a:spcAft>
-                <a:spcPts val="0"/>
-              </a:spcAft>
-              <a:buNone/>
-            </a:pPr>
-            <a:endParaRPr lang="en-US"/>
-          </a:p>
-        </p:txBody>
-      </p:sp>
-    </p:spTree>
-    <p:extLst>
-      <p:ext uri="{BB962C8B-B14F-4D97-AF65-F5344CB8AC3E}">
-        <p14:creationId xmlns:p14="http://schemas.microsoft.com/office/powerpoint/2010/main" val="1699856497"/>
-      </p:ext>
-    </p:extLst>
-  </p:cSld>
-  <p:clrMapOvr>
-    <a:masterClrMapping/>
-  </p:clrMapOvr>
-  <p:timing>
-    <p:tnLst>
-      <p:par>
-        <p:cTn id="1" dur="indefinite" restart="never" nodeType="tmRoot"/>
-      </p:par>
-    </p:tnLst>
-  </p:timing>
-</p:sld>
-</file>
-
-<file path=ppt/slides/slide5.xml><?xml version="1.0" encoding="utf-8"?>
-<p:sld xmlns:a="http://schemas.openxmlformats.org/drawingml/2006/main" xmlns:r="http://schemas.openxmlformats.org/officeDocument/2006/relationships" xmlns:p="http://schemas.openxmlformats.org/presentationml/2006/main">
-  <p:cSld>
-    <p:spTree>
-      <p:nvGrpSpPr>
         <p:cNvPr id="1" name=""/>
         <p:cNvGrpSpPr/>
         <p:nvPr/>
@@ -19339,7 +18663,7 @@
 </p:sld>
 </file>
 
-<file path=ppt/slides/slide6.xml><?xml version="1.0" encoding="utf-8"?>
+<file path=ppt/slides/slide11.xml><?xml version="1.0" encoding="utf-8"?>
 <p:sld xmlns:a="http://schemas.openxmlformats.org/drawingml/2006/main" xmlns:r="http://schemas.openxmlformats.org/officeDocument/2006/relationships" xmlns:p="http://schemas.openxmlformats.org/presentationml/2006/main">
   <p:cSld>
     <p:spTree>
@@ -19515,7 +18839,7 @@
 </p:sld>
 </file>
 
-<file path=ppt/slides/slide7.xml><?xml version="1.0" encoding="utf-8"?>
+<file path=ppt/slides/slide12.xml><?xml version="1.0" encoding="utf-8"?>
 <p:sld xmlns:a="http://schemas.openxmlformats.org/drawingml/2006/main" xmlns:r="http://schemas.openxmlformats.org/officeDocument/2006/relationships" xmlns:p="http://schemas.openxmlformats.org/presentationml/2006/main">
   <p:cSld>
     <p:spTree>
@@ -19676,7 +19000,7 @@
 </p:sld>
 </file>
 
-<file path=ppt/slides/slide8.xml><?xml version="1.0" encoding="utf-8"?>
+<file path=ppt/slides/slide13.xml><?xml version="1.0" encoding="utf-8"?>
 <p:sld xmlns:a="http://schemas.openxmlformats.org/drawingml/2006/main" xmlns:r="http://schemas.openxmlformats.org/officeDocument/2006/relationships" xmlns:p="http://schemas.openxmlformats.org/presentationml/2006/main">
   <p:cSld>
     <p:spTree>
@@ -20212,7 +19536,6 @@
               <a:rPr lang="en-US" sz="1200" dirty="0"/>
               <a:t> have done a great job “flattening curve”, downward curve after reopening order</a:t>
             </a:r>
-            <a:endParaRPr lang="en-US" sz="1200" dirty="0"/>
           </a:p>
         </p:txBody>
       </p:sp>
@@ -20376,6 +19699,1971 @@
 </p:sld>
 </file>
 
+<file path=ppt/slides/slide14.xml><?xml version="1.0" encoding="utf-8"?>
+<p:sld xmlns:a="http://schemas.openxmlformats.org/drawingml/2006/main" xmlns:r="http://schemas.openxmlformats.org/officeDocument/2006/relationships" xmlns:p="http://schemas.openxmlformats.org/presentationml/2006/main">
+  <p:cSld>
+    <p:spTree>
+      <p:nvGrpSpPr>
+        <p:cNvPr id="1" name=""/>
+        <p:cNvGrpSpPr/>
+        <p:nvPr/>
+      </p:nvGrpSpPr>
+      <p:grpSpPr>
+        <a:xfrm>
+          <a:off x="0" y="0"/>
+          <a:ext cx="0" cy="0"/>
+          <a:chOff x="0" y="0"/>
+          <a:chExt cx="0" cy="0"/>
+        </a:xfrm>
+      </p:grpSpPr>
+      <p:sp>
+        <p:nvSpPr>
+          <p:cNvPr id="3" name="Title 2"/>
+          <p:cNvSpPr>
+            <a:spLocks noGrp="1"/>
+          </p:cNvSpPr>
+          <p:nvPr>
+            <p:ph type="title"/>
+          </p:nvPr>
+        </p:nvSpPr>
+        <p:spPr/>
+        <p:txBody>
+          <a:bodyPr/>
+          <a:lstStyle/>
+          <a:p>
+            <a:r>
+              <a:rPr lang="en-US" dirty="0" smtClean="0"/>
+              <a:t>Future Work</a:t>
+            </a:r>
+            <a:endParaRPr lang="en-US" dirty="0"/>
+          </a:p>
+        </p:txBody>
+      </p:sp>
+      <p:sp>
+        <p:nvSpPr>
+          <p:cNvPr id="5" name="Text Placeholder 4"/>
+          <p:cNvSpPr>
+            <a:spLocks noGrp="1"/>
+          </p:cNvSpPr>
+          <p:nvPr>
+            <p:ph type="body" idx="3"/>
+          </p:nvPr>
+        </p:nvSpPr>
+        <p:spPr>
+          <a:xfrm>
+            <a:off x="844598" y="823590"/>
+            <a:ext cx="7209132" cy="3917642"/>
+          </a:xfrm>
+        </p:spPr>
+        <p:txBody>
+          <a:bodyPr/>
+          <a:lstStyle/>
+          <a:p>
+            <a:r>
+              <a:rPr lang="en-US" dirty="0" smtClean="0"/>
+              <a:t>Modifications on current visualizations</a:t>
+            </a:r>
+          </a:p>
+          <a:p>
+            <a:pPr lvl="1"/>
+            <a:r>
+              <a:rPr lang="en-US" dirty="0" smtClean="0"/>
+              <a:t>Additional filtration criteria of displays</a:t>
+            </a:r>
+          </a:p>
+          <a:p>
+            <a:pPr lvl="1"/>
+            <a:r>
+              <a:rPr lang="en-US" dirty="0" smtClean="0"/>
+              <a:t>Better filtration, grouping, and selection to focus on trends between groups of states</a:t>
+            </a:r>
+          </a:p>
+          <a:p>
+            <a:pPr lvl="1"/>
+            <a:r>
+              <a:rPr lang="en-US" dirty="0" smtClean="0"/>
+              <a:t>Splash page information more clear, demo on how to use/understand dashboard</a:t>
+            </a:r>
+          </a:p>
+          <a:p>
+            <a:pPr lvl="1"/>
+            <a:r>
+              <a:rPr lang="en-US" dirty="0" smtClean="0"/>
+              <a:t>General clarity updates of charts, legends etc. </a:t>
+            </a:r>
+          </a:p>
+          <a:p>
+            <a:r>
+              <a:rPr lang="en-US" dirty="0" smtClean="0"/>
+              <a:t>Additional visualizations</a:t>
+            </a:r>
+          </a:p>
+          <a:p>
+            <a:pPr lvl="1"/>
+            <a:r>
+              <a:rPr lang="en-US" dirty="0" smtClean="0"/>
+              <a:t>New tab of “current/up-to-date” data</a:t>
+            </a:r>
+          </a:p>
+          <a:p>
+            <a:pPr lvl="2"/>
+            <a:r>
+              <a:rPr lang="en-US" dirty="0" smtClean="0"/>
+              <a:t>US state map colored by selectable criteria (lockdown level, cases in last week, cases per capita etc.)</a:t>
+            </a:r>
+          </a:p>
+          <a:p>
+            <a:pPr lvl="2"/>
+            <a:r>
+              <a:rPr lang="en-US" dirty="0" smtClean="0"/>
+              <a:t> US State ranking based on selectable criteria</a:t>
+            </a:r>
+            <a:endParaRPr lang="en-US" dirty="0"/>
+          </a:p>
+        </p:txBody>
+      </p:sp>
+      <p:sp>
+        <p:nvSpPr>
+          <p:cNvPr id="6" name="Slide Number Placeholder 5"/>
+          <p:cNvSpPr>
+            <a:spLocks noGrp="1"/>
+          </p:cNvSpPr>
+          <p:nvPr>
+            <p:ph type="sldNum" idx="12"/>
+          </p:nvPr>
+        </p:nvSpPr>
+        <p:spPr/>
+        <p:txBody>
+          <a:bodyPr/>
+          <a:lstStyle/>
+          <a:p>
+            <a:pPr marL="0" lvl="0" indent="0" algn="r" rtl="0">
+              <a:spcBef>
+                <a:spcPts val="0"/>
+              </a:spcBef>
+              <a:spcAft>
+                <a:spcPts val="0"/>
+              </a:spcAft>
+              <a:buNone/>
+            </a:pPr>
+            <a:endParaRPr lang="en-US"/>
+          </a:p>
+        </p:txBody>
+      </p:sp>
+    </p:spTree>
+    <p:extLst>
+      <p:ext uri="{BB962C8B-B14F-4D97-AF65-F5344CB8AC3E}">
+        <p14:creationId xmlns:p14="http://schemas.microsoft.com/office/powerpoint/2010/main" val="197506335"/>
+      </p:ext>
+    </p:extLst>
+  </p:cSld>
+  <p:clrMapOvr>
+    <a:masterClrMapping/>
+  </p:clrMapOvr>
+  <p:timing>
+    <p:tnLst>
+      <p:par>
+        <p:cTn id="1" dur="indefinite" restart="never" nodeType="tmRoot"/>
+      </p:par>
+    </p:tnLst>
+  </p:timing>
+</p:sld>
+</file>
+
+<file path=ppt/slides/slide15.xml><?xml version="1.0" encoding="utf-8"?>
+<p:sld xmlns:a="http://schemas.openxmlformats.org/drawingml/2006/main" xmlns:r="http://schemas.openxmlformats.org/officeDocument/2006/relationships" xmlns:p="http://schemas.openxmlformats.org/presentationml/2006/main">
+  <p:cSld>
+    <p:spTree>
+      <p:nvGrpSpPr>
+        <p:cNvPr id="1" name="Shape 207"/>
+        <p:cNvGrpSpPr/>
+        <p:nvPr/>
+      </p:nvGrpSpPr>
+      <p:grpSpPr>
+        <a:xfrm>
+          <a:off x="0" y="0"/>
+          <a:ext cx="0" cy="0"/>
+          <a:chOff x="0" y="0"/>
+          <a:chExt cx="0" cy="0"/>
+        </a:xfrm>
+      </p:grpSpPr>
+    </p:spTree>
+  </p:cSld>
+  <p:clrMapOvr>
+    <a:masterClrMapping/>
+  </p:clrMapOvr>
+  <p:timing>
+    <p:tnLst>
+      <p:par>
+        <p:cTn id="1" dur="indefinite" restart="never" nodeType="tmRoot"/>
+      </p:par>
+    </p:tnLst>
+  </p:timing>
+</p:sld>
+</file>
+
+<file path=ppt/slides/slide2.xml><?xml version="1.0" encoding="utf-8"?>
+<p:sld xmlns:a="http://schemas.openxmlformats.org/drawingml/2006/main" xmlns:r="http://schemas.openxmlformats.org/officeDocument/2006/relationships" xmlns:p="http://schemas.openxmlformats.org/presentationml/2006/main">
+  <p:cSld>
+    <p:spTree>
+      <p:nvGrpSpPr>
+        <p:cNvPr id="1" name="Shape 186"/>
+        <p:cNvGrpSpPr/>
+        <p:nvPr/>
+      </p:nvGrpSpPr>
+      <p:grpSpPr>
+        <a:xfrm>
+          <a:off x="0" y="0"/>
+          <a:ext cx="0" cy="0"/>
+          <a:chOff x="0" y="0"/>
+          <a:chExt cx="0" cy="0"/>
+        </a:xfrm>
+      </p:grpSpPr>
+      <p:sp>
+        <p:nvSpPr>
+          <p:cNvPr id="188" name="Google Shape;188;p24"/>
+          <p:cNvSpPr txBox="1">
+            <a:spLocks noGrp="1"/>
+          </p:cNvSpPr>
+          <p:nvPr>
+            <p:ph type="title"/>
+          </p:nvPr>
+        </p:nvSpPr>
+        <p:spPr>
+          <a:xfrm>
+            <a:off x="254000" y="327899"/>
+            <a:ext cx="8514080" cy="434101"/>
+          </a:xfrm>
+          <a:prstGeom prst="rect">
+            <a:avLst/>
+          </a:prstGeom>
+          <a:noFill/>
+          <a:ln>
+            <a:noFill/>
+          </a:ln>
+        </p:spPr>
+        <p:txBody>
+          <a:bodyPr spcFirstLastPara="1" wrap="square" lIns="91425" tIns="45700" rIns="91425" bIns="45700" anchor="t" anchorCtr="0">
+            <a:noAutofit/>
+          </a:bodyPr>
+          <a:lstStyle/>
+          <a:p>
+            <a:pPr lvl="0">
+              <a:buSzPts val="2400"/>
+            </a:pPr>
+            <a:r>
+              <a:rPr lang="en-US" dirty="0"/>
+              <a:t>Motivation</a:t>
+            </a:r>
+            <a:endParaRPr dirty="0"/>
+          </a:p>
+        </p:txBody>
+      </p:sp>
+      <p:sp>
+        <p:nvSpPr>
+          <p:cNvPr id="190" name="Google Shape;190;p24"/>
+          <p:cNvSpPr txBox="1">
+            <a:spLocks noGrp="1"/>
+          </p:cNvSpPr>
+          <p:nvPr>
+            <p:ph type="body" idx="3"/>
+          </p:nvPr>
+        </p:nvSpPr>
+        <p:spPr>
+          <a:xfrm>
+            <a:off x="1088361" y="988855"/>
+            <a:ext cx="7066784" cy="3469913"/>
+          </a:xfrm>
+          <a:prstGeom prst="rect">
+            <a:avLst/>
+          </a:prstGeom>
+          <a:noFill/>
+          <a:ln>
+            <a:noFill/>
+          </a:ln>
+        </p:spPr>
+        <p:txBody>
+          <a:bodyPr spcFirstLastPara="1" wrap="square" lIns="91425" tIns="45700" rIns="91425" bIns="45700" anchor="t" anchorCtr="0">
+            <a:noAutofit/>
+          </a:bodyPr>
+          <a:lstStyle/>
+          <a:p>
+            <a:pPr marL="114300" indent="0">
+              <a:buNone/>
+            </a:pPr>
+            <a:r>
+              <a:rPr lang="en-US" dirty="0" smtClean="0"/>
+              <a:t>Goal: </a:t>
+            </a:r>
+          </a:p>
+          <a:p>
+            <a:pPr marL="114300" indent="0">
+              <a:buNone/>
+            </a:pPr>
+            <a:r>
+              <a:rPr lang="en-US" dirty="0" smtClean="0"/>
+              <a:t>Help answer the question “</a:t>
+            </a:r>
+            <a:r>
+              <a:rPr lang="en-US" i="1" dirty="0" smtClean="0"/>
+              <a:t>are </a:t>
+            </a:r>
+            <a:r>
+              <a:rPr lang="en-US" i="1" dirty="0" smtClean="0"/>
+              <a:t>state governments</a:t>
+            </a:r>
+            <a:r>
+              <a:rPr lang="en-US" i="1" dirty="0" smtClean="0"/>
+              <a:t> </a:t>
+            </a:r>
+            <a:r>
+              <a:rPr lang="en-US" i="1" dirty="0" smtClean="0"/>
+              <a:t>taking appropriate </a:t>
+            </a:r>
+            <a:r>
+              <a:rPr lang="en-US" i="1" dirty="0" smtClean="0"/>
+              <a:t>lockdown action </a:t>
+            </a:r>
+            <a:r>
+              <a:rPr lang="en-US" i="1" dirty="0" smtClean="0"/>
+              <a:t>in response to COVID-19</a:t>
+            </a:r>
+            <a:r>
+              <a:rPr lang="en-US" dirty="0" smtClean="0"/>
+              <a:t>?”</a:t>
+            </a:r>
+          </a:p>
+          <a:p>
+            <a:pPr marL="114300" indent="0">
+              <a:buNone/>
+            </a:pPr>
+            <a:endParaRPr lang="en-US" dirty="0" smtClean="0"/>
+          </a:p>
+          <a:p>
+            <a:pPr marL="114300" indent="0">
+              <a:buNone/>
+            </a:pPr>
+            <a:r>
+              <a:rPr lang="en-US" dirty="0" smtClean="0"/>
+              <a:t>Approach:</a:t>
+            </a:r>
+            <a:endParaRPr lang="en-US" dirty="0"/>
+          </a:p>
+          <a:p>
+            <a:r>
+              <a:rPr lang="en-US" dirty="0" smtClean="0"/>
+              <a:t>Design </a:t>
+            </a:r>
+            <a:r>
+              <a:rPr lang="en-US" dirty="0"/>
+              <a:t>an interactive tool to explore COVID-19 data from each state</a:t>
+            </a:r>
+          </a:p>
+          <a:p>
+            <a:pPr lvl="1"/>
+            <a:r>
+              <a:rPr lang="en-US" dirty="0"/>
+              <a:t>Both relative to all other states, and absolute scales</a:t>
+            </a:r>
+          </a:p>
+          <a:p>
+            <a:pPr lvl="1"/>
+            <a:r>
+              <a:rPr lang="en-US" dirty="0"/>
+              <a:t>Monitor individual states responses (</a:t>
+            </a:r>
+            <a:r>
+              <a:rPr lang="en-US" dirty="0" err="1"/>
+              <a:t>ie</a:t>
+            </a:r>
+            <a:r>
+              <a:rPr lang="en-US" dirty="0"/>
+              <a:t>. Lockdown orders)</a:t>
+            </a:r>
+          </a:p>
+          <a:p>
+            <a:pPr lvl="1"/>
+            <a:r>
+              <a:rPr lang="en-US" dirty="0"/>
+              <a:t>Allow sorting/filtering to view trends between states</a:t>
+            </a:r>
+          </a:p>
+          <a:p>
+            <a:pPr marL="457200" lvl="0" indent="-342900" algn="l" rtl="0">
+              <a:spcBef>
+                <a:spcPts val="0"/>
+              </a:spcBef>
+              <a:spcAft>
+                <a:spcPts val="0"/>
+              </a:spcAft>
+              <a:buSzPts val="1800"/>
+              <a:buAutoNum type="arabicPeriod"/>
+            </a:pPr>
+            <a:endParaRPr dirty="0"/>
+          </a:p>
+        </p:txBody>
+      </p:sp>
+      <p:sp>
+        <p:nvSpPr>
+          <p:cNvPr id="191" name="Google Shape;191;p24"/>
+          <p:cNvSpPr txBox="1">
+            <a:spLocks noGrp="1"/>
+          </p:cNvSpPr>
+          <p:nvPr>
+            <p:ph type="dt" idx="10"/>
+          </p:nvPr>
+        </p:nvSpPr>
+        <p:spPr>
+          <a:xfrm>
+            <a:off x="253999" y="4802823"/>
+            <a:ext cx="1422401" cy="274637"/>
+          </a:xfrm>
+          <a:prstGeom prst="rect">
+            <a:avLst/>
+          </a:prstGeom>
+          <a:noFill/>
+          <a:ln>
+            <a:noFill/>
+          </a:ln>
+        </p:spPr>
+        <p:txBody>
+          <a:bodyPr spcFirstLastPara="1" wrap="square" lIns="91425" tIns="45700" rIns="91425" bIns="45700" anchor="ctr" anchorCtr="0">
+            <a:noAutofit/>
+          </a:bodyPr>
+          <a:lstStyle/>
+          <a:p>
+            <a:pPr marL="0" lvl="0" indent="0" algn="l" rtl="0">
+              <a:spcBef>
+                <a:spcPts val="0"/>
+              </a:spcBef>
+              <a:spcAft>
+                <a:spcPts val="0"/>
+              </a:spcAft>
+              <a:buNone/>
+            </a:pPr>
+            <a:endParaRPr/>
+          </a:p>
+        </p:txBody>
+      </p:sp>
+      <p:sp>
+        <p:nvSpPr>
+          <p:cNvPr id="192" name="Google Shape;192;p24"/>
+          <p:cNvSpPr txBox="1">
+            <a:spLocks noGrp="1"/>
+          </p:cNvSpPr>
+          <p:nvPr>
+            <p:ph type="ftr" idx="11"/>
+          </p:nvPr>
+        </p:nvSpPr>
+        <p:spPr>
+          <a:xfrm>
+            <a:off x="1676401" y="4802823"/>
+            <a:ext cx="5791199" cy="274637"/>
+          </a:xfrm>
+          <a:prstGeom prst="rect">
+            <a:avLst/>
+          </a:prstGeom>
+          <a:noFill/>
+          <a:ln>
+            <a:noFill/>
+          </a:ln>
+        </p:spPr>
+        <p:txBody>
+          <a:bodyPr spcFirstLastPara="1" wrap="square" lIns="91425" tIns="45700" rIns="91425" bIns="45700" anchor="ctr" anchorCtr="0">
+            <a:noAutofit/>
+          </a:bodyPr>
+          <a:lstStyle/>
+          <a:p>
+            <a:pPr marL="0" lvl="0" indent="0" algn="ctr" rtl="0">
+              <a:spcBef>
+                <a:spcPts val="0"/>
+              </a:spcBef>
+              <a:spcAft>
+                <a:spcPts val="0"/>
+              </a:spcAft>
+              <a:buNone/>
+            </a:pPr>
+            <a:endParaRPr/>
+          </a:p>
+        </p:txBody>
+      </p:sp>
+      <p:sp>
+        <p:nvSpPr>
+          <p:cNvPr id="193" name="Google Shape;193;p24"/>
+          <p:cNvSpPr txBox="1">
+            <a:spLocks noGrp="1"/>
+          </p:cNvSpPr>
+          <p:nvPr>
+            <p:ph type="sldNum" idx="12"/>
+          </p:nvPr>
+        </p:nvSpPr>
+        <p:spPr>
+          <a:xfrm>
+            <a:off x="7467600" y="4802823"/>
+            <a:ext cx="586130" cy="272097"/>
+          </a:xfrm>
+          <a:prstGeom prst="rect">
+            <a:avLst/>
+          </a:prstGeom>
+          <a:noFill/>
+          <a:ln>
+            <a:noFill/>
+          </a:ln>
+        </p:spPr>
+        <p:txBody>
+          <a:bodyPr spcFirstLastPara="1" wrap="square" lIns="91425" tIns="45700" rIns="91425" bIns="45700" anchor="ctr" anchorCtr="0">
+            <a:noAutofit/>
+          </a:bodyPr>
+          <a:lstStyle/>
+          <a:p>
+            <a:pPr marL="0" lvl="0" indent="0" algn="r" rtl="0">
+              <a:spcBef>
+                <a:spcPts val="0"/>
+              </a:spcBef>
+              <a:spcAft>
+                <a:spcPts val="0"/>
+              </a:spcAft>
+              <a:buNone/>
+            </a:pPr>
+            <a:endParaRPr/>
+          </a:p>
+        </p:txBody>
+      </p:sp>
+    </p:spTree>
+  </p:cSld>
+  <p:clrMapOvr>
+    <a:masterClrMapping/>
+  </p:clrMapOvr>
+  <p:timing>
+    <p:tnLst>
+      <p:par>
+        <p:cTn id="1" dur="indefinite" restart="never" nodeType="tmRoot"/>
+      </p:par>
+    </p:tnLst>
+  </p:timing>
+</p:sld>
+</file>
+
+<file path=ppt/slides/slide3.xml><?xml version="1.0" encoding="utf-8"?>
+<p:sld xmlns:a="http://schemas.openxmlformats.org/drawingml/2006/main" xmlns:r="http://schemas.openxmlformats.org/officeDocument/2006/relationships" xmlns:p="http://schemas.openxmlformats.org/presentationml/2006/main">
+  <p:cSld>
+    <p:spTree>
+      <p:nvGrpSpPr>
+        <p:cNvPr id="1" name="Shape 198"/>
+        <p:cNvGrpSpPr/>
+        <p:nvPr/>
+      </p:nvGrpSpPr>
+      <p:grpSpPr>
+        <a:xfrm>
+          <a:off x="0" y="0"/>
+          <a:ext cx="0" cy="0"/>
+          <a:chOff x="0" y="0"/>
+          <a:chExt cx="0" cy="0"/>
+        </a:xfrm>
+      </p:grpSpPr>
+      <p:sp>
+        <p:nvSpPr>
+          <p:cNvPr id="200" name="Google Shape;200;p25"/>
+          <p:cNvSpPr txBox="1">
+            <a:spLocks noGrp="1"/>
+          </p:cNvSpPr>
+          <p:nvPr>
+            <p:ph type="title"/>
+          </p:nvPr>
+        </p:nvSpPr>
+        <p:spPr>
+          <a:xfrm>
+            <a:off x="254000" y="327899"/>
+            <a:ext cx="8514000" cy="434100"/>
+          </a:xfrm>
+          <a:prstGeom prst="rect">
+            <a:avLst/>
+          </a:prstGeom>
+        </p:spPr>
+        <p:txBody>
+          <a:bodyPr spcFirstLastPara="1" wrap="square" lIns="91425" tIns="45700" rIns="91425" bIns="45700" anchor="t" anchorCtr="0">
+            <a:noAutofit/>
+          </a:bodyPr>
+          <a:lstStyle/>
+          <a:p>
+            <a:pPr lvl="0"/>
+            <a:r>
+              <a:rPr lang="en-US" dirty="0"/>
+              <a:t>Technology Used</a:t>
+            </a:r>
+            <a:endParaRPr dirty="0"/>
+          </a:p>
+        </p:txBody>
+      </p:sp>
+      <p:sp>
+        <p:nvSpPr>
+          <p:cNvPr id="202" name="Google Shape;202;p25"/>
+          <p:cNvSpPr txBox="1">
+            <a:spLocks noGrp="1"/>
+          </p:cNvSpPr>
+          <p:nvPr>
+            <p:ph type="body" idx="3"/>
+          </p:nvPr>
+        </p:nvSpPr>
+        <p:spPr>
+          <a:xfrm>
+            <a:off x="949233" y="1343834"/>
+            <a:ext cx="6780300" cy="3409649"/>
+          </a:xfrm>
+          <a:prstGeom prst="rect">
+            <a:avLst/>
+          </a:prstGeom>
+        </p:spPr>
+        <p:txBody>
+          <a:bodyPr spcFirstLastPara="1" wrap="square" lIns="91425" tIns="45700" rIns="91425" bIns="45700" anchor="t" anchorCtr="0">
+            <a:noAutofit/>
+          </a:bodyPr>
+          <a:lstStyle/>
+          <a:p>
+            <a:r>
+              <a:rPr lang="en-US" dirty="0"/>
+              <a:t>Dashboard</a:t>
+            </a:r>
+          </a:p>
+          <a:p>
+            <a:pPr lvl="1"/>
+            <a:r>
+              <a:rPr lang="en-US" dirty="0"/>
+              <a:t>Built in </a:t>
+            </a:r>
+            <a:r>
+              <a:rPr lang="en-US" dirty="0" smtClean="0"/>
+              <a:t>D3</a:t>
+            </a:r>
+          </a:p>
+          <a:p>
+            <a:pPr lvl="1"/>
+            <a:endParaRPr lang="en-US" dirty="0" smtClean="0"/>
+          </a:p>
+          <a:p>
+            <a:r>
+              <a:rPr lang="en-US" dirty="0" smtClean="0"/>
+              <a:t>Datasets</a:t>
+            </a:r>
+            <a:endParaRPr lang="en-US" dirty="0"/>
+          </a:p>
+          <a:p>
+            <a:pPr lvl="1"/>
+            <a:r>
+              <a:rPr lang="en-US" dirty="0" err="1"/>
+              <a:t>CovidTrackingProject</a:t>
+            </a:r>
+            <a:r>
+              <a:rPr lang="en-US" dirty="0"/>
+              <a:t> - API</a:t>
+            </a:r>
+          </a:p>
+          <a:p>
+            <a:pPr lvl="1"/>
+            <a:r>
+              <a:rPr lang="en-US" dirty="0" err="1"/>
+              <a:t>Johnhopkins</a:t>
+            </a:r>
+            <a:r>
+              <a:rPr lang="en-US" dirty="0"/>
+              <a:t> University - API</a:t>
+            </a:r>
+          </a:p>
+          <a:p>
+            <a:pPr lvl="1"/>
+            <a:r>
+              <a:rPr lang="en-US" dirty="0"/>
+              <a:t>US States lockdown orders - Manually gathered</a:t>
+            </a:r>
+          </a:p>
+          <a:p>
+            <a:pPr lvl="1"/>
+            <a:r>
+              <a:rPr lang="en-US" dirty="0"/>
+              <a:t>Other relevant state datasets (population, political </a:t>
+            </a:r>
+            <a:r>
+              <a:rPr lang="en-US" dirty="0" smtClean="0"/>
+              <a:t>affiliation </a:t>
+            </a:r>
+            <a:r>
+              <a:rPr lang="en-US" dirty="0"/>
+              <a:t>etc.)</a:t>
+            </a:r>
+          </a:p>
+          <a:p>
+            <a:pPr marL="914400" lvl="0" indent="0" algn="l" rtl="0">
+              <a:spcBef>
+                <a:spcPts val="360"/>
+              </a:spcBef>
+              <a:spcAft>
+                <a:spcPts val="0"/>
+              </a:spcAft>
+              <a:buNone/>
+            </a:pPr>
+            <a:endParaRPr dirty="0"/>
+          </a:p>
+        </p:txBody>
+      </p:sp>
+      <p:sp>
+        <p:nvSpPr>
+          <p:cNvPr id="203" name="Google Shape;203;p25"/>
+          <p:cNvSpPr txBox="1">
+            <a:spLocks noGrp="1"/>
+          </p:cNvSpPr>
+          <p:nvPr>
+            <p:ph type="sldNum" idx="12"/>
+          </p:nvPr>
+        </p:nvSpPr>
+        <p:spPr>
+          <a:xfrm>
+            <a:off x="7467600" y="4802823"/>
+            <a:ext cx="586200" cy="272100"/>
+          </a:xfrm>
+          <a:prstGeom prst="rect">
+            <a:avLst/>
+          </a:prstGeom>
+        </p:spPr>
+        <p:txBody>
+          <a:bodyPr spcFirstLastPara="1" wrap="square" lIns="91425" tIns="45700" rIns="91425" bIns="45700" anchor="ctr" anchorCtr="0">
+            <a:noAutofit/>
+          </a:bodyPr>
+          <a:lstStyle/>
+          <a:p>
+            <a:pPr marL="0" lvl="0" indent="0" algn="r" rtl="0">
+              <a:spcBef>
+                <a:spcPts val="0"/>
+              </a:spcBef>
+              <a:spcAft>
+                <a:spcPts val="0"/>
+              </a:spcAft>
+              <a:buNone/>
+            </a:pPr>
+            <a:endParaRPr/>
+          </a:p>
+        </p:txBody>
+      </p:sp>
+    </p:spTree>
+  </p:cSld>
+  <p:clrMapOvr>
+    <a:masterClrMapping/>
+  </p:clrMapOvr>
+  <p:timing>
+    <p:tnLst>
+      <p:par>
+        <p:cTn id="1" dur="indefinite" restart="never" nodeType="tmRoot"/>
+      </p:par>
+    </p:tnLst>
+  </p:timing>
+</p:sld>
+</file>
+
+<file path=ppt/slides/slide4.xml><?xml version="1.0" encoding="utf-8"?>
+<p:sld xmlns:a="http://schemas.openxmlformats.org/drawingml/2006/main" xmlns:r="http://schemas.openxmlformats.org/officeDocument/2006/relationships" xmlns:p="http://schemas.openxmlformats.org/presentationml/2006/main">
+  <p:cSld>
+    <p:spTree>
+      <p:nvGrpSpPr>
+        <p:cNvPr id="1" name=""/>
+        <p:cNvGrpSpPr/>
+        <p:nvPr/>
+      </p:nvGrpSpPr>
+      <p:grpSpPr>
+        <a:xfrm>
+          <a:off x="0" y="0"/>
+          <a:ext cx="0" cy="0"/>
+          <a:chOff x="0" y="0"/>
+          <a:chExt cx="0" cy="0"/>
+        </a:xfrm>
+      </p:grpSpPr>
+      <p:sp>
+        <p:nvSpPr>
+          <p:cNvPr id="2" name="Text Placeholder 1"/>
+          <p:cNvSpPr>
+            <a:spLocks noGrp="1"/>
+          </p:cNvSpPr>
+          <p:nvPr>
+            <p:ph type="body" idx="1"/>
+          </p:nvPr>
+        </p:nvSpPr>
+        <p:spPr/>
+        <p:txBody>
+          <a:bodyPr/>
+          <a:lstStyle/>
+          <a:p>
+            <a:endParaRPr lang="en-US"/>
+          </a:p>
+        </p:txBody>
+      </p:sp>
+      <p:sp>
+        <p:nvSpPr>
+          <p:cNvPr id="3" name="Title 2"/>
+          <p:cNvSpPr>
+            <a:spLocks noGrp="1"/>
+          </p:cNvSpPr>
+          <p:nvPr>
+            <p:ph type="title"/>
+          </p:nvPr>
+        </p:nvSpPr>
+        <p:spPr/>
+        <p:txBody>
+          <a:bodyPr/>
+          <a:lstStyle/>
+          <a:p>
+            <a:r>
+              <a:rPr lang="en-US" dirty="0" smtClean="0"/>
+              <a:t>Dashboard</a:t>
+            </a:r>
+            <a:endParaRPr lang="en-US" dirty="0"/>
+          </a:p>
+        </p:txBody>
+      </p:sp>
+      <p:sp>
+        <p:nvSpPr>
+          <p:cNvPr id="4" name="Text Placeholder 3"/>
+          <p:cNvSpPr>
+            <a:spLocks noGrp="1"/>
+          </p:cNvSpPr>
+          <p:nvPr>
+            <p:ph type="body" idx="2"/>
+          </p:nvPr>
+        </p:nvSpPr>
+        <p:spPr/>
+        <p:txBody>
+          <a:bodyPr/>
+          <a:lstStyle/>
+          <a:p>
+            <a:endParaRPr lang="en-US" dirty="0"/>
+          </a:p>
+        </p:txBody>
+      </p:sp>
+      <p:sp>
+        <p:nvSpPr>
+          <p:cNvPr id="6" name="Slide Number Placeholder 5"/>
+          <p:cNvSpPr>
+            <a:spLocks noGrp="1"/>
+          </p:cNvSpPr>
+          <p:nvPr>
+            <p:ph type="sldNum" idx="12"/>
+          </p:nvPr>
+        </p:nvSpPr>
+        <p:spPr/>
+        <p:txBody>
+          <a:bodyPr/>
+          <a:lstStyle/>
+          <a:p>
+            <a:pPr marL="0" lvl="0" indent="0" algn="r" rtl="0">
+              <a:spcBef>
+                <a:spcPts val="0"/>
+              </a:spcBef>
+              <a:spcAft>
+                <a:spcPts val="0"/>
+              </a:spcAft>
+              <a:buNone/>
+            </a:pPr>
+            <a:endParaRPr lang="en-US"/>
+          </a:p>
+        </p:txBody>
+      </p:sp>
+      <p:pic>
+        <p:nvPicPr>
+          <p:cNvPr id="7" name="Picture 6"/>
+          <p:cNvPicPr>
+            <a:picLocks noChangeAspect="1"/>
+          </p:cNvPicPr>
+          <p:nvPr/>
+        </p:nvPicPr>
+        <p:blipFill>
+          <a:blip r:embed="rId2"/>
+          <a:stretch>
+            <a:fillRect/>
+          </a:stretch>
+        </p:blipFill>
+        <p:spPr>
+          <a:xfrm>
+            <a:off x="254000" y="1437124"/>
+            <a:ext cx="5781688" cy="3036015"/>
+          </a:xfrm>
+          <a:prstGeom prst="rect">
+            <a:avLst/>
+          </a:prstGeom>
+        </p:spPr>
+      </p:pic>
+      <p:sp>
+        <p:nvSpPr>
+          <p:cNvPr id="10" name="TextBox 9"/>
+          <p:cNvSpPr txBox="1"/>
+          <p:nvPr/>
+        </p:nvSpPr>
+        <p:spPr>
+          <a:xfrm>
+            <a:off x="6128426" y="1437124"/>
+            <a:ext cx="2855068" cy="1600438"/>
+          </a:xfrm>
+          <a:prstGeom prst="rect">
+            <a:avLst/>
+          </a:prstGeom>
+          <a:noFill/>
+        </p:spPr>
+        <p:txBody>
+          <a:bodyPr wrap="square" rtlCol="0">
+            <a:spAutoFit/>
+          </a:bodyPr>
+          <a:lstStyle/>
+          <a:p>
+            <a:pPr marL="285750" indent="-285750">
+              <a:buFont typeface="Arial" panose="020B0604020202020204" pitchFamily="34" charset="0"/>
+              <a:buChar char="•"/>
+            </a:pPr>
+            <a:r>
+              <a:rPr lang="en-US" dirty="0" smtClean="0"/>
+              <a:t>Represent all states where possible</a:t>
+            </a:r>
+          </a:p>
+          <a:p>
+            <a:pPr marL="285750" indent="-285750">
+              <a:buFont typeface="Arial" panose="020B0604020202020204" pitchFamily="34" charset="0"/>
+              <a:buChar char="•"/>
+            </a:pPr>
+            <a:r>
+              <a:rPr lang="en-US" dirty="0" smtClean="0"/>
+              <a:t>Highlight states when selected for comparison</a:t>
+            </a:r>
+          </a:p>
+          <a:p>
+            <a:pPr marL="285750" indent="-285750">
+              <a:buFont typeface="Arial" panose="020B0604020202020204" pitchFamily="34" charset="0"/>
+              <a:buChar char="•"/>
+            </a:pPr>
+            <a:r>
+              <a:rPr lang="en-US" dirty="0" smtClean="0"/>
+              <a:t>Interactive for user, most objects clickable to select/more information</a:t>
+            </a:r>
+            <a:endParaRPr lang="en-US" dirty="0"/>
+          </a:p>
+        </p:txBody>
+      </p:sp>
+    </p:spTree>
+    <p:extLst>
+      <p:ext uri="{BB962C8B-B14F-4D97-AF65-F5344CB8AC3E}">
+        <p14:creationId xmlns:p14="http://schemas.microsoft.com/office/powerpoint/2010/main" val="288143564"/>
+      </p:ext>
+    </p:extLst>
+  </p:cSld>
+  <p:clrMapOvr>
+    <a:masterClrMapping/>
+  </p:clrMapOvr>
+  <p:timing>
+    <p:tnLst>
+      <p:par>
+        <p:cTn id="1" dur="indefinite" restart="never" nodeType="tmRoot"/>
+      </p:par>
+    </p:tnLst>
+  </p:timing>
+</p:sld>
+</file>
+
+<file path=ppt/slides/slide5.xml><?xml version="1.0" encoding="utf-8"?>
+<p:sld xmlns:a="http://schemas.openxmlformats.org/drawingml/2006/main" xmlns:r="http://schemas.openxmlformats.org/officeDocument/2006/relationships" xmlns:p="http://schemas.openxmlformats.org/presentationml/2006/main">
+  <p:cSld>
+    <p:spTree>
+      <p:nvGrpSpPr>
+        <p:cNvPr id="1" name=""/>
+        <p:cNvGrpSpPr/>
+        <p:nvPr/>
+      </p:nvGrpSpPr>
+      <p:grpSpPr>
+        <a:xfrm>
+          <a:off x="0" y="0"/>
+          <a:ext cx="0" cy="0"/>
+          <a:chOff x="0" y="0"/>
+          <a:chExt cx="0" cy="0"/>
+        </a:xfrm>
+      </p:grpSpPr>
+      <p:sp>
+        <p:nvSpPr>
+          <p:cNvPr id="2" name="Text Placeholder 1"/>
+          <p:cNvSpPr>
+            <a:spLocks noGrp="1"/>
+          </p:cNvSpPr>
+          <p:nvPr>
+            <p:ph type="body" idx="1"/>
+          </p:nvPr>
+        </p:nvSpPr>
+        <p:spPr/>
+        <p:txBody>
+          <a:bodyPr/>
+          <a:lstStyle/>
+          <a:p>
+            <a:endParaRPr lang="en-US"/>
+          </a:p>
+        </p:txBody>
+      </p:sp>
+      <p:sp>
+        <p:nvSpPr>
+          <p:cNvPr id="3" name="Title 2"/>
+          <p:cNvSpPr>
+            <a:spLocks noGrp="1"/>
+          </p:cNvSpPr>
+          <p:nvPr>
+            <p:ph type="title"/>
+          </p:nvPr>
+        </p:nvSpPr>
+        <p:spPr/>
+        <p:txBody>
+          <a:bodyPr/>
+          <a:lstStyle/>
+          <a:p>
+            <a:r>
+              <a:rPr lang="en-US" dirty="0" smtClean="0"/>
+              <a:t>Dashboard Components</a:t>
+            </a:r>
+            <a:endParaRPr lang="en-US" dirty="0"/>
+          </a:p>
+        </p:txBody>
+      </p:sp>
+      <p:sp>
+        <p:nvSpPr>
+          <p:cNvPr id="4" name="Text Placeholder 3"/>
+          <p:cNvSpPr>
+            <a:spLocks noGrp="1"/>
+          </p:cNvSpPr>
+          <p:nvPr>
+            <p:ph type="body" idx="2"/>
+          </p:nvPr>
+        </p:nvSpPr>
+        <p:spPr/>
+        <p:txBody>
+          <a:bodyPr/>
+          <a:lstStyle/>
+          <a:p>
+            <a:endParaRPr lang="en-US" dirty="0"/>
+          </a:p>
+        </p:txBody>
+      </p:sp>
+      <p:sp>
+        <p:nvSpPr>
+          <p:cNvPr id="6" name="Slide Number Placeholder 5"/>
+          <p:cNvSpPr>
+            <a:spLocks noGrp="1"/>
+          </p:cNvSpPr>
+          <p:nvPr>
+            <p:ph type="sldNum" idx="12"/>
+          </p:nvPr>
+        </p:nvSpPr>
+        <p:spPr/>
+        <p:txBody>
+          <a:bodyPr/>
+          <a:lstStyle/>
+          <a:p>
+            <a:pPr marL="0" lvl="0" indent="0" algn="r" rtl="0">
+              <a:spcBef>
+                <a:spcPts val="0"/>
+              </a:spcBef>
+              <a:spcAft>
+                <a:spcPts val="0"/>
+              </a:spcAft>
+              <a:buNone/>
+            </a:pPr>
+            <a:endParaRPr lang="en-US"/>
+          </a:p>
+        </p:txBody>
+      </p:sp>
+      <p:pic>
+        <p:nvPicPr>
+          <p:cNvPr id="7" name="Picture 6"/>
+          <p:cNvPicPr>
+            <a:picLocks noChangeAspect="1"/>
+          </p:cNvPicPr>
+          <p:nvPr/>
+        </p:nvPicPr>
+        <p:blipFill>
+          <a:blip r:embed="rId2"/>
+          <a:stretch>
+            <a:fillRect/>
+          </a:stretch>
+        </p:blipFill>
+        <p:spPr>
+          <a:xfrm>
+            <a:off x="254000" y="1437124"/>
+            <a:ext cx="5781688" cy="3036015"/>
+          </a:xfrm>
+          <a:prstGeom prst="rect">
+            <a:avLst/>
+          </a:prstGeom>
+        </p:spPr>
+      </p:pic>
+      <p:sp>
+        <p:nvSpPr>
+          <p:cNvPr id="8" name="Rectangle 7"/>
+          <p:cNvSpPr/>
+          <p:nvPr/>
+        </p:nvSpPr>
+        <p:spPr>
+          <a:xfrm>
+            <a:off x="293429" y="1574136"/>
+            <a:ext cx="5378877" cy="256635"/>
+          </a:xfrm>
+          <a:prstGeom prst="rect">
+            <a:avLst/>
+          </a:prstGeom>
+          <a:noFill/>
+          <a:ln w="9525">
+            <a:solidFill>
+              <a:srgbClr val="FFFF00"/>
+            </a:solidFill>
+          </a:ln>
+        </p:spPr>
+        <p:style>
+          <a:lnRef idx="2">
+            <a:schemeClr val="accent1">
+              <a:shade val="50000"/>
+            </a:schemeClr>
+          </a:lnRef>
+          <a:fillRef idx="1">
+            <a:schemeClr val="accent1"/>
+          </a:fillRef>
+          <a:effectRef idx="0">
+            <a:schemeClr val="accent1"/>
+          </a:effectRef>
+          <a:fontRef idx="minor">
+            <a:schemeClr val="lt1"/>
+          </a:fontRef>
+        </p:style>
+        <p:txBody>
+          <a:bodyPr rtlCol="0" anchor="ctr"/>
+          <a:lstStyle/>
+          <a:p>
+            <a:pPr algn="ctr"/>
+            <a:endParaRPr lang="en-US"/>
+          </a:p>
+        </p:txBody>
+      </p:sp>
+      <p:sp>
+        <p:nvSpPr>
+          <p:cNvPr id="9" name="TextBox 8"/>
+          <p:cNvSpPr txBox="1"/>
+          <p:nvPr/>
+        </p:nvSpPr>
+        <p:spPr>
+          <a:xfrm>
+            <a:off x="6128426" y="1437124"/>
+            <a:ext cx="2855068" cy="954107"/>
+          </a:xfrm>
+          <a:prstGeom prst="rect">
+            <a:avLst/>
+          </a:prstGeom>
+          <a:noFill/>
+        </p:spPr>
+        <p:txBody>
+          <a:bodyPr wrap="square" rtlCol="0">
+            <a:spAutoFit/>
+          </a:bodyPr>
+          <a:lstStyle/>
+          <a:p>
+            <a:r>
+              <a:rPr lang="en-US" dirty="0" smtClean="0"/>
+              <a:t>Selection Tool:</a:t>
+            </a:r>
+          </a:p>
+          <a:p>
+            <a:pPr marL="285750" indent="-285750">
+              <a:buFont typeface="Arial" panose="020B0604020202020204" pitchFamily="34" charset="0"/>
+              <a:buChar char="•"/>
+            </a:pPr>
+            <a:r>
+              <a:rPr lang="en-US" dirty="0" smtClean="0"/>
+              <a:t>Used for Selecting and unselecting states</a:t>
+            </a:r>
+          </a:p>
+          <a:p>
+            <a:pPr marL="285750" indent="-285750">
+              <a:buFont typeface="Arial" panose="020B0604020202020204" pitchFamily="34" charset="0"/>
+              <a:buChar char="•"/>
+            </a:pPr>
+            <a:r>
+              <a:rPr lang="en-US" dirty="0" smtClean="0"/>
+              <a:t>Functions as Color Legend</a:t>
+            </a:r>
+            <a:endParaRPr lang="en-US" dirty="0"/>
+          </a:p>
+        </p:txBody>
+      </p:sp>
+    </p:spTree>
+    <p:extLst>
+      <p:ext uri="{BB962C8B-B14F-4D97-AF65-F5344CB8AC3E}">
+        <p14:creationId xmlns:p14="http://schemas.microsoft.com/office/powerpoint/2010/main" val="3515663786"/>
+      </p:ext>
+    </p:extLst>
+  </p:cSld>
+  <p:clrMapOvr>
+    <a:masterClrMapping/>
+  </p:clrMapOvr>
+  <p:timing>
+    <p:tnLst>
+      <p:par>
+        <p:cTn id="1" dur="indefinite" restart="never" nodeType="tmRoot"/>
+      </p:par>
+    </p:tnLst>
+  </p:timing>
+</p:sld>
+</file>
+
+<file path=ppt/slides/slide6.xml><?xml version="1.0" encoding="utf-8"?>
+<p:sld xmlns:a="http://schemas.openxmlformats.org/drawingml/2006/main" xmlns:r="http://schemas.openxmlformats.org/officeDocument/2006/relationships" xmlns:p="http://schemas.openxmlformats.org/presentationml/2006/main">
+  <p:cSld>
+    <p:spTree>
+      <p:nvGrpSpPr>
+        <p:cNvPr id="1" name=""/>
+        <p:cNvGrpSpPr/>
+        <p:nvPr/>
+      </p:nvGrpSpPr>
+      <p:grpSpPr>
+        <a:xfrm>
+          <a:off x="0" y="0"/>
+          <a:ext cx="0" cy="0"/>
+          <a:chOff x="0" y="0"/>
+          <a:chExt cx="0" cy="0"/>
+        </a:xfrm>
+      </p:grpSpPr>
+      <p:sp>
+        <p:nvSpPr>
+          <p:cNvPr id="2" name="Text Placeholder 1"/>
+          <p:cNvSpPr>
+            <a:spLocks noGrp="1"/>
+          </p:cNvSpPr>
+          <p:nvPr>
+            <p:ph type="body" idx="1"/>
+          </p:nvPr>
+        </p:nvSpPr>
+        <p:spPr/>
+        <p:txBody>
+          <a:bodyPr/>
+          <a:lstStyle/>
+          <a:p>
+            <a:endParaRPr lang="en-US"/>
+          </a:p>
+        </p:txBody>
+      </p:sp>
+      <p:sp>
+        <p:nvSpPr>
+          <p:cNvPr id="3" name="Title 2"/>
+          <p:cNvSpPr>
+            <a:spLocks noGrp="1"/>
+          </p:cNvSpPr>
+          <p:nvPr>
+            <p:ph type="title"/>
+          </p:nvPr>
+        </p:nvSpPr>
+        <p:spPr/>
+        <p:txBody>
+          <a:bodyPr/>
+          <a:lstStyle/>
+          <a:p>
+            <a:r>
+              <a:rPr lang="en-US" dirty="0" smtClean="0"/>
+              <a:t>Dashboard Components</a:t>
+            </a:r>
+            <a:endParaRPr lang="en-US" dirty="0"/>
+          </a:p>
+        </p:txBody>
+      </p:sp>
+      <p:sp>
+        <p:nvSpPr>
+          <p:cNvPr id="4" name="Text Placeholder 3"/>
+          <p:cNvSpPr>
+            <a:spLocks noGrp="1"/>
+          </p:cNvSpPr>
+          <p:nvPr>
+            <p:ph type="body" idx="2"/>
+          </p:nvPr>
+        </p:nvSpPr>
+        <p:spPr/>
+        <p:txBody>
+          <a:bodyPr/>
+          <a:lstStyle/>
+          <a:p>
+            <a:endParaRPr lang="en-US" dirty="0"/>
+          </a:p>
+        </p:txBody>
+      </p:sp>
+      <p:sp>
+        <p:nvSpPr>
+          <p:cNvPr id="6" name="Slide Number Placeholder 5"/>
+          <p:cNvSpPr>
+            <a:spLocks noGrp="1"/>
+          </p:cNvSpPr>
+          <p:nvPr>
+            <p:ph type="sldNum" idx="12"/>
+          </p:nvPr>
+        </p:nvSpPr>
+        <p:spPr/>
+        <p:txBody>
+          <a:bodyPr/>
+          <a:lstStyle/>
+          <a:p>
+            <a:pPr marL="0" lvl="0" indent="0" algn="r" rtl="0">
+              <a:spcBef>
+                <a:spcPts val="0"/>
+              </a:spcBef>
+              <a:spcAft>
+                <a:spcPts val="0"/>
+              </a:spcAft>
+              <a:buNone/>
+            </a:pPr>
+            <a:endParaRPr lang="en-US"/>
+          </a:p>
+        </p:txBody>
+      </p:sp>
+      <p:pic>
+        <p:nvPicPr>
+          <p:cNvPr id="7" name="Picture 6"/>
+          <p:cNvPicPr>
+            <a:picLocks noChangeAspect="1"/>
+          </p:cNvPicPr>
+          <p:nvPr/>
+        </p:nvPicPr>
+        <p:blipFill>
+          <a:blip r:embed="rId2"/>
+          <a:stretch>
+            <a:fillRect/>
+          </a:stretch>
+        </p:blipFill>
+        <p:spPr>
+          <a:xfrm>
+            <a:off x="254000" y="1437124"/>
+            <a:ext cx="5781688" cy="3036015"/>
+          </a:xfrm>
+          <a:prstGeom prst="rect">
+            <a:avLst/>
+          </a:prstGeom>
+        </p:spPr>
+      </p:pic>
+      <p:sp>
+        <p:nvSpPr>
+          <p:cNvPr id="8" name="Rectangle 7"/>
+          <p:cNvSpPr/>
+          <p:nvPr/>
+        </p:nvSpPr>
+        <p:spPr>
+          <a:xfrm>
+            <a:off x="3161489" y="1819072"/>
+            <a:ext cx="2864472" cy="2639475"/>
+          </a:xfrm>
+          <a:prstGeom prst="rect">
+            <a:avLst/>
+          </a:prstGeom>
+          <a:noFill/>
+          <a:ln w="9525">
+            <a:solidFill>
+              <a:srgbClr val="FFFF00"/>
+            </a:solidFill>
+          </a:ln>
+        </p:spPr>
+        <p:style>
+          <a:lnRef idx="2">
+            <a:schemeClr val="accent1">
+              <a:shade val="50000"/>
+            </a:schemeClr>
+          </a:lnRef>
+          <a:fillRef idx="1">
+            <a:schemeClr val="accent1"/>
+          </a:fillRef>
+          <a:effectRef idx="0">
+            <a:schemeClr val="accent1"/>
+          </a:effectRef>
+          <a:fontRef idx="minor">
+            <a:schemeClr val="lt1"/>
+          </a:fontRef>
+        </p:style>
+        <p:txBody>
+          <a:bodyPr rtlCol="0" anchor="ctr"/>
+          <a:lstStyle/>
+          <a:p>
+            <a:pPr algn="ctr"/>
+            <a:endParaRPr lang="en-US"/>
+          </a:p>
+        </p:txBody>
+      </p:sp>
+      <p:sp>
+        <p:nvSpPr>
+          <p:cNvPr id="9" name="TextBox 8"/>
+          <p:cNvSpPr txBox="1"/>
+          <p:nvPr/>
+        </p:nvSpPr>
+        <p:spPr>
+          <a:xfrm>
+            <a:off x="6128426" y="1437124"/>
+            <a:ext cx="2855068" cy="954107"/>
+          </a:xfrm>
+          <a:prstGeom prst="rect">
+            <a:avLst/>
+          </a:prstGeom>
+          <a:noFill/>
+        </p:spPr>
+        <p:txBody>
+          <a:bodyPr wrap="square" rtlCol="0">
+            <a:spAutoFit/>
+          </a:bodyPr>
+          <a:lstStyle/>
+          <a:p>
+            <a:r>
+              <a:rPr lang="en-US" dirty="0" smtClean="0"/>
+              <a:t>State Issued Orders:</a:t>
+            </a:r>
+          </a:p>
+          <a:p>
+            <a:pPr marL="285750" indent="-285750">
+              <a:buFont typeface="Arial" panose="020B0604020202020204" pitchFamily="34" charset="0"/>
+              <a:buChar char="•"/>
+            </a:pPr>
+            <a:r>
+              <a:rPr lang="en-US" dirty="0" smtClean="0"/>
+              <a:t>Issues ordered per day</a:t>
+            </a:r>
+          </a:p>
+          <a:p>
+            <a:pPr marL="285750" indent="-285750">
+              <a:buFont typeface="Arial" panose="020B0604020202020204" pitchFamily="34" charset="0"/>
+              <a:buChar char="•"/>
+            </a:pPr>
+            <a:r>
+              <a:rPr lang="en-US" dirty="0" smtClean="0"/>
+              <a:t>Individual state’s lockdown level over time</a:t>
+            </a:r>
+          </a:p>
+        </p:txBody>
+      </p:sp>
+    </p:spTree>
+    <p:extLst>
+      <p:ext uri="{BB962C8B-B14F-4D97-AF65-F5344CB8AC3E}">
+        <p14:creationId xmlns:p14="http://schemas.microsoft.com/office/powerpoint/2010/main" val="3205560154"/>
+      </p:ext>
+    </p:extLst>
+  </p:cSld>
+  <p:clrMapOvr>
+    <a:masterClrMapping/>
+  </p:clrMapOvr>
+  <p:timing>
+    <p:tnLst>
+      <p:par>
+        <p:cTn id="1" dur="indefinite" restart="never" nodeType="tmRoot"/>
+      </p:par>
+    </p:tnLst>
+  </p:timing>
+</p:sld>
+</file>
+
+<file path=ppt/slides/slide7.xml><?xml version="1.0" encoding="utf-8"?>
+<p:sld xmlns:a="http://schemas.openxmlformats.org/drawingml/2006/main" xmlns:r="http://schemas.openxmlformats.org/officeDocument/2006/relationships" xmlns:p="http://schemas.openxmlformats.org/presentationml/2006/main">
+  <p:cSld>
+    <p:spTree>
+      <p:nvGrpSpPr>
+        <p:cNvPr id="1" name=""/>
+        <p:cNvGrpSpPr/>
+        <p:nvPr/>
+      </p:nvGrpSpPr>
+      <p:grpSpPr>
+        <a:xfrm>
+          <a:off x="0" y="0"/>
+          <a:ext cx="0" cy="0"/>
+          <a:chOff x="0" y="0"/>
+          <a:chExt cx="0" cy="0"/>
+        </a:xfrm>
+      </p:grpSpPr>
+      <p:sp>
+        <p:nvSpPr>
+          <p:cNvPr id="2" name="Text Placeholder 1"/>
+          <p:cNvSpPr>
+            <a:spLocks noGrp="1"/>
+          </p:cNvSpPr>
+          <p:nvPr>
+            <p:ph type="body" idx="1"/>
+          </p:nvPr>
+        </p:nvSpPr>
+        <p:spPr/>
+        <p:txBody>
+          <a:bodyPr/>
+          <a:lstStyle/>
+          <a:p>
+            <a:endParaRPr lang="en-US"/>
+          </a:p>
+        </p:txBody>
+      </p:sp>
+      <p:sp>
+        <p:nvSpPr>
+          <p:cNvPr id="3" name="Title 2"/>
+          <p:cNvSpPr>
+            <a:spLocks noGrp="1"/>
+          </p:cNvSpPr>
+          <p:nvPr>
+            <p:ph type="title"/>
+          </p:nvPr>
+        </p:nvSpPr>
+        <p:spPr/>
+        <p:txBody>
+          <a:bodyPr/>
+          <a:lstStyle/>
+          <a:p>
+            <a:r>
+              <a:rPr lang="en-US" dirty="0" smtClean="0"/>
+              <a:t>Dashboard Components</a:t>
+            </a:r>
+            <a:endParaRPr lang="en-US" dirty="0"/>
+          </a:p>
+        </p:txBody>
+      </p:sp>
+      <p:sp>
+        <p:nvSpPr>
+          <p:cNvPr id="4" name="Text Placeholder 3"/>
+          <p:cNvSpPr>
+            <a:spLocks noGrp="1"/>
+          </p:cNvSpPr>
+          <p:nvPr>
+            <p:ph type="body" idx="2"/>
+          </p:nvPr>
+        </p:nvSpPr>
+        <p:spPr/>
+        <p:txBody>
+          <a:bodyPr/>
+          <a:lstStyle/>
+          <a:p>
+            <a:endParaRPr lang="en-US" dirty="0"/>
+          </a:p>
+        </p:txBody>
+      </p:sp>
+      <p:sp>
+        <p:nvSpPr>
+          <p:cNvPr id="6" name="Slide Number Placeholder 5"/>
+          <p:cNvSpPr>
+            <a:spLocks noGrp="1"/>
+          </p:cNvSpPr>
+          <p:nvPr>
+            <p:ph type="sldNum" idx="12"/>
+          </p:nvPr>
+        </p:nvSpPr>
+        <p:spPr/>
+        <p:txBody>
+          <a:bodyPr/>
+          <a:lstStyle/>
+          <a:p>
+            <a:pPr marL="0" lvl="0" indent="0" algn="r" rtl="0">
+              <a:spcBef>
+                <a:spcPts val="0"/>
+              </a:spcBef>
+              <a:spcAft>
+                <a:spcPts val="0"/>
+              </a:spcAft>
+              <a:buNone/>
+            </a:pPr>
+            <a:endParaRPr lang="en-US"/>
+          </a:p>
+        </p:txBody>
+      </p:sp>
+      <p:pic>
+        <p:nvPicPr>
+          <p:cNvPr id="7" name="Picture 6"/>
+          <p:cNvPicPr>
+            <a:picLocks noChangeAspect="1"/>
+          </p:cNvPicPr>
+          <p:nvPr/>
+        </p:nvPicPr>
+        <p:blipFill>
+          <a:blip r:embed="rId2"/>
+          <a:stretch>
+            <a:fillRect/>
+          </a:stretch>
+        </p:blipFill>
+        <p:spPr>
+          <a:xfrm>
+            <a:off x="254000" y="1437124"/>
+            <a:ext cx="5781688" cy="3036015"/>
+          </a:xfrm>
+          <a:prstGeom prst="rect">
+            <a:avLst/>
+          </a:prstGeom>
+        </p:spPr>
+      </p:pic>
+      <p:sp>
+        <p:nvSpPr>
+          <p:cNvPr id="8" name="Rectangle 7"/>
+          <p:cNvSpPr/>
+          <p:nvPr/>
+        </p:nvSpPr>
+        <p:spPr>
+          <a:xfrm>
+            <a:off x="288565" y="3164608"/>
+            <a:ext cx="2853469" cy="1266341"/>
+          </a:xfrm>
+          <a:prstGeom prst="rect">
+            <a:avLst/>
+          </a:prstGeom>
+          <a:noFill/>
+          <a:ln w="9525">
+            <a:solidFill>
+              <a:srgbClr val="FFFF00"/>
+            </a:solidFill>
+          </a:ln>
+        </p:spPr>
+        <p:style>
+          <a:lnRef idx="2">
+            <a:schemeClr val="accent1">
+              <a:shade val="50000"/>
+            </a:schemeClr>
+          </a:lnRef>
+          <a:fillRef idx="1">
+            <a:schemeClr val="accent1"/>
+          </a:fillRef>
+          <a:effectRef idx="0">
+            <a:schemeClr val="accent1"/>
+          </a:effectRef>
+          <a:fontRef idx="minor">
+            <a:schemeClr val="lt1"/>
+          </a:fontRef>
+        </p:style>
+        <p:txBody>
+          <a:bodyPr rtlCol="0" anchor="ctr"/>
+          <a:lstStyle/>
+          <a:p>
+            <a:pPr algn="ctr"/>
+            <a:endParaRPr lang="en-US"/>
+          </a:p>
+        </p:txBody>
+      </p:sp>
+      <p:sp>
+        <p:nvSpPr>
+          <p:cNvPr id="9" name="TextBox 8"/>
+          <p:cNvSpPr txBox="1"/>
+          <p:nvPr/>
+        </p:nvSpPr>
+        <p:spPr>
+          <a:xfrm>
+            <a:off x="6128426" y="1437124"/>
+            <a:ext cx="2855068" cy="1384995"/>
+          </a:xfrm>
+          <a:prstGeom prst="rect">
+            <a:avLst/>
+          </a:prstGeom>
+          <a:noFill/>
+        </p:spPr>
+        <p:txBody>
+          <a:bodyPr wrap="square" rtlCol="0">
+            <a:spAutoFit/>
+          </a:bodyPr>
+          <a:lstStyle/>
+          <a:p>
+            <a:r>
+              <a:rPr lang="en-US" dirty="0" smtClean="0"/>
+              <a:t>Severity Bubbles:</a:t>
+            </a:r>
+          </a:p>
+          <a:p>
+            <a:pPr marL="285750" indent="-285750">
+              <a:buFont typeface="Arial" panose="020B0604020202020204" pitchFamily="34" charset="0"/>
+              <a:buChar char="•"/>
+            </a:pPr>
+            <a:r>
+              <a:rPr lang="en-US" dirty="0" smtClean="0"/>
+              <a:t>Comparison of states “severity” when lockdown happened locally</a:t>
+            </a:r>
+          </a:p>
+          <a:p>
+            <a:pPr marL="285750" lvl="4" indent="-285750">
+              <a:buFont typeface="Arial" panose="020B0604020202020204" pitchFamily="34" charset="0"/>
+              <a:buChar char="•"/>
+            </a:pPr>
+            <a:r>
+              <a:rPr lang="en-US" dirty="0" smtClean="0"/>
+              <a:t>Selection criteria to find trends between states</a:t>
+            </a:r>
+          </a:p>
+        </p:txBody>
+      </p:sp>
+    </p:spTree>
+    <p:extLst>
+      <p:ext uri="{BB962C8B-B14F-4D97-AF65-F5344CB8AC3E}">
+        <p14:creationId xmlns:p14="http://schemas.microsoft.com/office/powerpoint/2010/main" val="1366124464"/>
+      </p:ext>
+    </p:extLst>
+  </p:cSld>
+  <p:clrMapOvr>
+    <a:masterClrMapping/>
+  </p:clrMapOvr>
+  <p:timing>
+    <p:tnLst>
+      <p:par>
+        <p:cTn id="1" dur="indefinite" restart="never" nodeType="tmRoot"/>
+      </p:par>
+    </p:tnLst>
+  </p:timing>
+</p:sld>
+</file>
+
+<file path=ppt/slides/slide8.xml><?xml version="1.0" encoding="utf-8"?>
+<p:sld xmlns:a="http://schemas.openxmlformats.org/drawingml/2006/main" xmlns:r="http://schemas.openxmlformats.org/officeDocument/2006/relationships" xmlns:p="http://schemas.openxmlformats.org/presentationml/2006/main">
+  <p:cSld>
+    <p:spTree>
+      <p:nvGrpSpPr>
+        <p:cNvPr id="1" name=""/>
+        <p:cNvGrpSpPr/>
+        <p:nvPr/>
+      </p:nvGrpSpPr>
+      <p:grpSpPr>
+        <a:xfrm>
+          <a:off x="0" y="0"/>
+          <a:ext cx="0" cy="0"/>
+          <a:chOff x="0" y="0"/>
+          <a:chExt cx="0" cy="0"/>
+        </a:xfrm>
+      </p:grpSpPr>
+      <p:sp>
+        <p:nvSpPr>
+          <p:cNvPr id="2" name="Text Placeholder 1"/>
+          <p:cNvSpPr>
+            <a:spLocks noGrp="1"/>
+          </p:cNvSpPr>
+          <p:nvPr>
+            <p:ph type="body" idx="1"/>
+          </p:nvPr>
+        </p:nvSpPr>
+        <p:spPr/>
+        <p:txBody>
+          <a:bodyPr/>
+          <a:lstStyle/>
+          <a:p>
+            <a:endParaRPr lang="en-US"/>
+          </a:p>
+        </p:txBody>
+      </p:sp>
+      <p:sp>
+        <p:nvSpPr>
+          <p:cNvPr id="3" name="Title 2"/>
+          <p:cNvSpPr>
+            <a:spLocks noGrp="1"/>
+          </p:cNvSpPr>
+          <p:nvPr>
+            <p:ph type="title"/>
+          </p:nvPr>
+        </p:nvSpPr>
+        <p:spPr/>
+        <p:txBody>
+          <a:bodyPr/>
+          <a:lstStyle/>
+          <a:p>
+            <a:r>
+              <a:rPr lang="en-US" dirty="0" smtClean="0"/>
+              <a:t>Dashboard Components</a:t>
+            </a:r>
+            <a:endParaRPr lang="en-US" dirty="0"/>
+          </a:p>
+        </p:txBody>
+      </p:sp>
+      <p:sp>
+        <p:nvSpPr>
+          <p:cNvPr id="4" name="Text Placeholder 3"/>
+          <p:cNvSpPr>
+            <a:spLocks noGrp="1"/>
+          </p:cNvSpPr>
+          <p:nvPr>
+            <p:ph type="body" idx="2"/>
+          </p:nvPr>
+        </p:nvSpPr>
+        <p:spPr/>
+        <p:txBody>
+          <a:bodyPr/>
+          <a:lstStyle/>
+          <a:p>
+            <a:endParaRPr lang="en-US" dirty="0"/>
+          </a:p>
+        </p:txBody>
+      </p:sp>
+      <p:sp>
+        <p:nvSpPr>
+          <p:cNvPr id="6" name="Slide Number Placeholder 5"/>
+          <p:cNvSpPr>
+            <a:spLocks noGrp="1"/>
+          </p:cNvSpPr>
+          <p:nvPr>
+            <p:ph type="sldNum" idx="12"/>
+          </p:nvPr>
+        </p:nvSpPr>
+        <p:spPr/>
+        <p:txBody>
+          <a:bodyPr/>
+          <a:lstStyle/>
+          <a:p>
+            <a:pPr marL="0" lvl="0" indent="0" algn="r" rtl="0">
+              <a:spcBef>
+                <a:spcPts val="0"/>
+              </a:spcBef>
+              <a:spcAft>
+                <a:spcPts val="0"/>
+              </a:spcAft>
+              <a:buNone/>
+            </a:pPr>
+            <a:endParaRPr lang="en-US"/>
+          </a:p>
+        </p:txBody>
+      </p:sp>
+      <p:pic>
+        <p:nvPicPr>
+          <p:cNvPr id="7" name="Picture 6"/>
+          <p:cNvPicPr>
+            <a:picLocks noChangeAspect="1"/>
+          </p:cNvPicPr>
+          <p:nvPr/>
+        </p:nvPicPr>
+        <p:blipFill>
+          <a:blip r:embed="rId2"/>
+          <a:stretch>
+            <a:fillRect/>
+          </a:stretch>
+        </p:blipFill>
+        <p:spPr>
+          <a:xfrm>
+            <a:off x="254000" y="1437124"/>
+            <a:ext cx="5781688" cy="3036015"/>
+          </a:xfrm>
+          <a:prstGeom prst="rect">
+            <a:avLst/>
+          </a:prstGeom>
+        </p:spPr>
+      </p:pic>
+      <p:sp>
+        <p:nvSpPr>
+          <p:cNvPr id="8" name="Rectangle 7"/>
+          <p:cNvSpPr/>
+          <p:nvPr/>
+        </p:nvSpPr>
+        <p:spPr>
+          <a:xfrm>
+            <a:off x="293429" y="1836783"/>
+            <a:ext cx="2858333" cy="1310115"/>
+          </a:xfrm>
+          <a:prstGeom prst="rect">
+            <a:avLst/>
+          </a:prstGeom>
+          <a:noFill/>
+          <a:ln w="9525">
+            <a:solidFill>
+              <a:srgbClr val="FFFF00"/>
+            </a:solidFill>
+          </a:ln>
+        </p:spPr>
+        <p:style>
+          <a:lnRef idx="2">
+            <a:schemeClr val="accent1">
+              <a:shade val="50000"/>
+            </a:schemeClr>
+          </a:lnRef>
+          <a:fillRef idx="1">
+            <a:schemeClr val="accent1"/>
+          </a:fillRef>
+          <a:effectRef idx="0">
+            <a:schemeClr val="accent1"/>
+          </a:effectRef>
+          <a:fontRef idx="minor">
+            <a:schemeClr val="lt1"/>
+          </a:fontRef>
+        </p:style>
+        <p:txBody>
+          <a:bodyPr rtlCol="0" anchor="ctr"/>
+          <a:lstStyle/>
+          <a:p>
+            <a:pPr algn="ctr"/>
+            <a:endParaRPr lang="en-US"/>
+          </a:p>
+        </p:txBody>
+      </p:sp>
+      <p:sp>
+        <p:nvSpPr>
+          <p:cNvPr id="9" name="TextBox 8"/>
+          <p:cNvSpPr txBox="1"/>
+          <p:nvPr/>
+        </p:nvSpPr>
+        <p:spPr>
+          <a:xfrm>
+            <a:off x="6128426" y="1437124"/>
+            <a:ext cx="2855068" cy="1815882"/>
+          </a:xfrm>
+          <a:prstGeom prst="rect">
+            <a:avLst/>
+          </a:prstGeom>
+          <a:noFill/>
+        </p:spPr>
+        <p:txBody>
+          <a:bodyPr wrap="square" rtlCol="0">
+            <a:spAutoFit/>
+          </a:bodyPr>
+          <a:lstStyle/>
+          <a:p>
+            <a:r>
+              <a:rPr lang="en-US" dirty="0" smtClean="0"/>
+              <a:t>Covid-19 Trajectory Chart:</a:t>
+            </a:r>
+          </a:p>
+          <a:p>
+            <a:pPr marL="285750" indent="-285750">
+              <a:buFont typeface="Arial" panose="020B0604020202020204" pitchFamily="34" charset="0"/>
+              <a:buChar char="•"/>
+            </a:pPr>
+            <a:r>
+              <a:rPr lang="en-US" dirty="0" smtClean="0"/>
+              <a:t>Different than standard Log Cases vs Time</a:t>
+            </a:r>
+          </a:p>
+          <a:p>
+            <a:pPr marL="285750" indent="-285750">
+              <a:buFont typeface="Arial" panose="020B0604020202020204" pitchFamily="34" charset="0"/>
+              <a:buChar char="•"/>
+            </a:pPr>
+            <a:r>
+              <a:rPr lang="en-US" dirty="0" smtClean="0"/>
+              <a:t>Instead is Log new cases vs Log total cases</a:t>
+            </a:r>
+          </a:p>
+          <a:p>
+            <a:pPr marL="285750" indent="-285750">
+              <a:buFont typeface="Arial" panose="020B0604020202020204" pitchFamily="34" charset="0"/>
+              <a:buChar char="•"/>
+            </a:pPr>
+            <a:r>
+              <a:rPr lang="en-US" dirty="0" smtClean="0"/>
+              <a:t>Easily highlights “flattening curve”</a:t>
+            </a:r>
+          </a:p>
+          <a:p>
+            <a:pPr marL="285750" indent="-285750">
+              <a:buFont typeface="Arial" panose="020B0604020202020204" pitchFamily="34" charset="0"/>
+              <a:buChar char="•"/>
+            </a:pPr>
+            <a:r>
+              <a:rPr lang="en-US" dirty="0" smtClean="0"/>
+              <a:t>Marks orders for each state</a:t>
+            </a:r>
+            <a:endParaRPr lang="en-US" dirty="0"/>
+          </a:p>
+        </p:txBody>
+      </p:sp>
+    </p:spTree>
+    <p:extLst>
+      <p:ext uri="{BB962C8B-B14F-4D97-AF65-F5344CB8AC3E}">
+        <p14:creationId xmlns:p14="http://schemas.microsoft.com/office/powerpoint/2010/main" val="268452670"/>
+      </p:ext>
+    </p:extLst>
+  </p:cSld>
+  <p:clrMapOvr>
+    <a:masterClrMapping/>
+  </p:clrMapOvr>
+  <p:timing>
+    <p:tnLst>
+      <p:par>
+        <p:cTn id="1" dur="indefinite" restart="never" nodeType="tmRoot"/>
+      </p:par>
+    </p:tnLst>
+  </p:timing>
+</p:sld>
+</file>
+
 <file path=ppt/slides/slide9.xml><?xml version="1.0" encoding="utf-8"?>
 <p:sld xmlns:a="http://schemas.openxmlformats.org/drawingml/2006/main" xmlns:r="http://schemas.openxmlformats.org/officeDocument/2006/relationships" xmlns:p="http://schemas.openxmlformats.org/presentationml/2006/main">
   <p:cSld>
@@ -20410,7 +21698,7 @@
           <a:p>
             <a:r>
               <a:rPr lang="en-US" dirty="0" smtClean="0"/>
-              <a:t>Future Work</a:t>
+              <a:t>Demo</a:t>
             </a:r>
             <a:endParaRPr lang="en-US" dirty="0"/>
           </a:p>
@@ -20426,82 +21714,16 @@
             <p:ph type="body" idx="3"/>
           </p:nvPr>
         </p:nvSpPr>
-        <p:spPr>
-          <a:xfrm>
-            <a:off x="844598" y="823590"/>
-            <a:ext cx="7209132" cy="3917642"/>
-          </a:xfrm>
-        </p:spPr>
+        <p:spPr/>
         <p:txBody>
           <a:bodyPr/>
           <a:lstStyle/>
           <a:p>
             <a:r>
-              <a:rPr lang="en-US" dirty="0" smtClean="0"/>
-              <a:t>Modifications on current visualizations</a:t>
-            </a:r>
-          </a:p>
-          <a:p>
-            <a:pPr lvl="1"/>
-            <a:r>
-              <a:rPr lang="en-US" dirty="0" smtClean="0"/>
-              <a:t>Additional filtration criteria of displays</a:t>
-            </a:r>
-          </a:p>
-          <a:p>
-            <a:pPr lvl="1"/>
-            <a:r>
-              <a:rPr lang="en-US" dirty="0" smtClean="0"/>
-              <a:t>Better filtration, grouping, and selection to focus on trends between groups of states</a:t>
-            </a:r>
-          </a:p>
-          <a:p>
-            <a:pPr lvl="1"/>
-            <a:r>
-              <a:rPr lang="en-US" dirty="0" smtClean="0"/>
-              <a:t>Splash page information more clear, demo on how to use/understand dashboard</a:t>
-            </a:r>
-          </a:p>
-          <a:p>
-            <a:pPr lvl="1"/>
-            <a:r>
-              <a:rPr lang="en-US" dirty="0" smtClean="0"/>
-              <a:t>General clarity updates of charts, legends etc. </a:t>
-            </a:r>
-          </a:p>
-          <a:p>
-            <a:r>
-              <a:rPr lang="en-US" dirty="0" smtClean="0"/>
-              <a:t>Additional visualizations</a:t>
-            </a:r>
-          </a:p>
-          <a:p>
-            <a:pPr lvl="1"/>
-            <a:r>
-              <a:rPr lang="en-US" dirty="0" smtClean="0"/>
-              <a:t>New tab of “</a:t>
-            </a:r>
-            <a:r>
-              <a:rPr lang="en-US" dirty="0" smtClean="0"/>
-              <a:t>current/up-to-date” </a:t>
-            </a:r>
-            <a:r>
-              <a:rPr lang="en-US" dirty="0" smtClean="0"/>
-              <a:t>data</a:t>
-            </a:r>
-          </a:p>
-          <a:p>
-            <a:pPr lvl="2"/>
-            <a:r>
-              <a:rPr lang="en-US" dirty="0" smtClean="0"/>
-              <a:t>US state map colored by selectable criteria (lockdown level, cases in last week, cases per capita etc.)</a:t>
-            </a:r>
-          </a:p>
-          <a:p>
-            <a:pPr lvl="2"/>
-            <a:r>
-              <a:rPr lang="en-US" dirty="0" smtClean="0"/>
-              <a:t> US State ranking based on selectable criteria</a:t>
+              <a:rPr lang="en-US">
+                <a:hlinkClick r:id="rId2"/>
+              </a:rPr>
+              <a:t>https://ericjunkins.github.io/covid-19-us-states/</a:t>
             </a:r>
             <a:endParaRPr lang="en-US" dirty="0"/>
           </a:p>
@@ -20538,7 +21760,7 @@
     </p:spTree>
     <p:extLst>
       <p:ext uri="{BB962C8B-B14F-4D97-AF65-F5344CB8AC3E}">
-        <p14:creationId xmlns:p14="http://schemas.microsoft.com/office/powerpoint/2010/main" val="197506335"/>
+        <p14:creationId xmlns:p14="http://schemas.microsoft.com/office/powerpoint/2010/main" val="1699856497"/>
       </p:ext>
     </p:extLst>
   </p:cSld>

</xml_diff>